<commit_message>
Finishing touches added to power point slides
</commit_message>
<xml_diff>
--- a/Presentation with comments.pptx
+++ b/Presentation with comments.pptx
@@ -5,10 +5,10 @@
     <p:sldMasterId id="2147483648" r:id="rId4"/>
   </p:sldMasterIdLst>
   <p:notesMasterIdLst>
-    <p:notesMasterId r:id="rId21"/>
+    <p:notesMasterId r:id="rId22"/>
   </p:notesMasterIdLst>
   <p:handoutMasterIdLst>
-    <p:handoutMasterId r:id="rId22"/>
+    <p:handoutMasterId r:id="rId23"/>
   </p:handoutMasterIdLst>
   <p:sldIdLst>
     <p:sldId id="265" r:id="rId5"/>
@@ -20,18 +20,19 @@
     <p:sldId id="310" r:id="rId11"/>
     <p:sldId id="311" r:id="rId12"/>
     <p:sldId id="313" r:id="rId13"/>
-    <p:sldId id="314" r:id="rId14"/>
-    <p:sldId id="316" r:id="rId15"/>
-    <p:sldId id="322" r:id="rId16"/>
-    <p:sldId id="317" r:id="rId17"/>
-    <p:sldId id="323" r:id="rId18"/>
-    <p:sldId id="324" r:id="rId19"/>
-    <p:sldId id="325" r:id="rId20"/>
+    <p:sldId id="326" r:id="rId14"/>
+    <p:sldId id="314" r:id="rId15"/>
+    <p:sldId id="316" r:id="rId16"/>
+    <p:sldId id="322" r:id="rId17"/>
+    <p:sldId id="317" r:id="rId18"/>
+    <p:sldId id="323" r:id="rId19"/>
+    <p:sldId id="324" r:id="rId20"/>
+    <p:sldId id="325" r:id="rId21"/>
   </p:sldIdLst>
   <p:sldSz cx="12188825" cy="6858000"/>
   <p:notesSz cx="6858000" cy="9144000"/>
   <p:custDataLst>
-    <p:tags r:id="rId23"/>
+    <p:tags r:id="rId24"/>
   </p:custDataLst>
   <p:defaultTextStyle>
     <a:defPPr>
@@ -232,7 +233,7 @@
           <a:p>
             <a:fld id="{D0CC69C6-EE0B-4D8B-9C71-C36EFED094F2}" type="datetimeFigureOut">
               <a:rPr lang="en-US"/>
-              <a:t>12/9/2019</a:t>
+              <a:t>12/11/2019</a:t>
             </a:fld>
             <a:endParaRPr/>
           </a:p>
@@ -397,7 +398,7 @@
           <a:p>
             <a:fld id="{3ABD2D7A-D230-4F91-BD59-0A39C2703BA8}" type="datetimeFigureOut">
               <a:rPr lang="en-US"/>
-              <a:t>12/9/2019</a:t>
+              <a:t>12/11/2019</a:t>
             </a:fld>
             <a:endParaRPr/>
           </a:p>
@@ -796,8 +797,12 @@
           <a:lstStyle/>
           <a:p>
             <a:r>
-              <a:rPr lang="en-GB" baseline="0" dirty="0"/>
-              <a:t>Some features in the original data was not produced as a visual due to NANs in several fields.  Most of the features that were dropped appeared to be duplicates of existing data, but with slightly different names.  The names were identical, but the dropped fields started with f_&lt;name&gt;.  A visual inspection of the data determined these fields were not adding any value to the data.  Ten columns in all were dropped from the features after this initial exploration.  All data was scaled to ensure unit of measurement would not skew results.</a:t>
+              <a:rPr lang="en-GB" dirty="0"/>
+              <a:t>Finally a quick look at the data distributions may help decide which models to run the data on as well as identify potential outliers within the data.  The data should be scaled before any modelling occurs since each feature uses a different scale </a:t>
+            </a:r>
+            <a:r>
+              <a:rPr lang="en-GB"/>
+              <a:t>of measurement.</a:t>
             </a:r>
             <a:endParaRPr lang="en-GB" dirty="0"/>
           </a:p>
@@ -829,7 +834,7 @@
     </p:spTree>
     <p:extLst>
       <p:ext uri="{BB962C8B-B14F-4D97-AF65-F5344CB8AC3E}">
-        <p14:creationId xmlns:p14="http://schemas.microsoft.com/office/powerpoint/2010/main" val="1809093803"/>
+        <p14:creationId xmlns:p14="http://schemas.microsoft.com/office/powerpoint/2010/main" val="598034310"/>
       </p:ext>
     </p:extLst>
   </p:cSld>
@@ -884,76 +889,8 @@
           <a:lstStyle/>
           <a:p>
             <a:r>
-              <a:rPr lang="en-GB" dirty="0"/>
-              <a:t>After dropping these columns the</a:t>
-            </a:r>
-            <a:r>
               <a:rPr lang="en-GB" baseline="0" dirty="0"/>
-              <a:t> goal was</a:t>
-            </a:r>
-            <a:r>
-              <a:rPr lang="en-GB" dirty="0"/>
-              <a:t> to maximise the amount of</a:t>
-            </a:r>
-            <a:r>
-              <a:rPr lang="en-GB" baseline="0" dirty="0"/>
-              <a:t> remaining data to work with.  The first thing attempted was running </a:t>
-            </a:r>
-            <a:r>
-              <a:rPr lang="en-GB" baseline="0" dirty="0" err="1"/>
-              <a:t>dropna</a:t>
-            </a:r>
-            <a:r>
-              <a:rPr lang="en-GB" baseline="0" dirty="0"/>
-              <a:t>() on the data to find out what was left.  The data was so sparse it was uncertain how effectively it could be used to train the models.  To overcome this several solutions to the data problem were used and run to see how the models were affected.  The worst column for missing data was one labelled </a:t>
-            </a:r>
-            <a:r>
-              <a:rPr lang="en-GB" baseline="0" dirty="0" err="1"/>
-              <a:t>VertPosm</a:t>
-            </a:r>
-            <a:r>
-              <a:rPr lang="en-GB" baseline="0" dirty="0"/>
-              <a:t>.  A decision to drop this column before running </a:t>
-            </a:r>
-            <a:r>
-              <a:rPr lang="en-GB" baseline="0" dirty="0" err="1"/>
-              <a:t>dropna</a:t>
-            </a:r>
-            <a:r>
-              <a:rPr lang="en-GB" baseline="0" dirty="0"/>
-              <a:t>() was made to see how the resulting </a:t>
-            </a:r>
-            <a:r>
-              <a:rPr lang="en-GB" baseline="0" dirty="0" err="1"/>
-              <a:t>dataframe</a:t>
-            </a:r>
-            <a:r>
-              <a:rPr lang="en-GB" baseline="0" dirty="0"/>
-              <a:t> would be affected.  In doing so there was still enough actual data to be used to model. The sparse data was also tested to see if it would work since it would include </a:t>
-            </a:r>
-            <a:r>
-              <a:rPr lang="en-GB" baseline="0" dirty="0" err="1"/>
-              <a:t>vertPosm</a:t>
-            </a:r>
-            <a:r>
-              <a:rPr lang="en-GB" baseline="0" dirty="0"/>
-              <a:t>. It was important to know if this could be a key factor in the data.  Additionally, keeping all features in the data, but filling missing values with zeroes was investigated for its effect on modelling. A similar process  was used on just </a:t>
-            </a:r>
-            <a:r>
-              <a:rPr lang="en-GB" baseline="0" dirty="0" err="1"/>
-              <a:t>vertPosm</a:t>
-            </a:r>
-            <a:r>
-              <a:rPr lang="en-GB" baseline="0" dirty="0"/>
-              <a:t> followed by running </a:t>
-            </a:r>
-            <a:r>
-              <a:rPr lang="en-GB" baseline="0" dirty="0" err="1"/>
-              <a:t>dropna</a:t>
-            </a:r>
-            <a:r>
-              <a:rPr lang="en-GB" baseline="0" dirty="0"/>
-              <a:t> on all other features.  Finally synthetic data was created to see how creating a dataset as large or small as desired would affect performance.  The concern in these approaches centred around losing key features, or diluting the data to an unusable degree.  If there were too many filled values around the same time as a weather event then the models may rate readings of 0 as significant predictors.</a:t>
+              <a:t>Some features in the original data was not produced as a visual due to NANs in several fields.  Most of the features that were dropped appeared to be duplicates of existing data, but with slightly different names.  The names were identical, but the dropped fields started with f_&lt;name&gt;.  A visual inspection of the data determined these fields were not adding any value to the data.  Ten columns in all were dropped from the features after this initial exploration.  All data was scaled to ensure unit of measurement would not skew results.</a:t>
             </a:r>
             <a:endParaRPr lang="en-GB" dirty="0"/>
           </a:p>
@@ -985,7 +922,7 @@
     </p:spTree>
     <p:extLst>
       <p:ext uri="{BB962C8B-B14F-4D97-AF65-F5344CB8AC3E}">
-        <p14:creationId xmlns:p14="http://schemas.microsoft.com/office/powerpoint/2010/main" val="906887884"/>
+        <p14:creationId xmlns:p14="http://schemas.microsoft.com/office/powerpoint/2010/main" val="1809093803"/>
       </p:ext>
     </p:extLst>
   </p:cSld>
@@ -1041,15 +978,75 @@
           <a:p>
             <a:r>
               <a:rPr lang="en-GB" dirty="0"/>
-              <a:t>To help with addressing all concerns and data sizes, </a:t>
-            </a:r>
-            <a:r>
-              <a:rPr lang="en-GB" dirty="0" err="1"/>
-              <a:t>scikit-learn’s</a:t>
+              <a:t>After dropping these columns the</a:t>
             </a:r>
             <a:r>
               <a:rPr lang="en-GB" baseline="0" dirty="0"/>
-              <a:t> helpful flowchart of learning algorithms was used.  After following the flow chart the models were researched to decide on which ones would generate the best results.  One particular thing about referring to this chart is the helpful guide on data size as a determining factor of informed model selection.  </a:t>
+              <a:t> goal was</a:t>
+            </a:r>
+            <a:r>
+              <a:rPr lang="en-GB" dirty="0"/>
+              <a:t> to maximise the amount of</a:t>
+            </a:r>
+            <a:r>
+              <a:rPr lang="en-GB" baseline="0" dirty="0"/>
+              <a:t> remaining data to work with.  The first thing attempted was running </a:t>
+            </a:r>
+            <a:r>
+              <a:rPr lang="en-GB" baseline="0" dirty="0" err="1"/>
+              <a:t>dropna</a:t>
+            </a:r>
+            <a:r>
+              <a:rPr lang="en-GB" baseline="0" dirty="0"/>
+              <a:t>() on the data to find out what was left.  The data was so sparse it was uncertain how effectively it could be used to train the models.  To overcome this several solutions to the data problem were used and run to see how the models were affected.  The worst column for missing data was one labelled </a:t>
+            </a:r>
+            <a:r>
+              <a:rPr lang="en-GB" baseline="0" dirty="0" err="1"/>
+              <a:t>VertPosm</a:t>
+            </a:r>
+            <a:r>
+              <a:rPr lang="en-GB" baseline="0" dirty="0"/>
+              <a:t>.  A decision to drop this column before running </a:t>
+            </a:r>
+            <a:r>
+              <a:rPr lang="en-GB" baseline="0" dirty="0" err="1"/>
+              <a:t>dropna</a:t>
+            </a:r>
+            <a:r>
+              <a:rPr lang="en-GB" baseline="0" dirty="0"/>
+              <a:t>() was made to see how the resulting </a:t>
+            </a:r>
+            <a:r>
+              <a:rPr lang="en-GB" baseline="0" dirty="0" err="1"/>
+              <a:t>dataframe</a:t>
+            </a:r>
+            <a:r>
+              <a:rPr lang="en-GB" baseline="0" dirty="0"/>
+              <a:t> would be affected.  In doing so there was still enough actual data to be used to model. The sparse data was also tested to see if it would work since it would include </a:t>
+            </a:r>
+            <a:r>
+              <a:rPr lang="en-GB" baseline="0" dirty="0" err="1"/>
+              <a:t>vertPosm</a:t>
+            </a:r>
+            <a:r>
+              <a:rPr lang="en-GB" baseline="0" dirty="0"/>
+              <a:t>. It was important to know if this could be a key factor in the data.  Additionally, keeping all features in the data, but filling missing values with zeroes was investigated for its effect on modelling. A similar process  was used on just </a:t>
+            </a:r>
+            <a:r>
+              <a:rPr lang="en-GB" baseline="0" dirty="0" err="1"/>
+              <a:t>vertPosm</a:t>
+            </a:r>
+            <a:r>
+              <a:rPr lang="en-GB" baseline="0" dirty="0"/>
+              <a:t> followed by running </a:t>
+            </a:r>
+            <a:r>
+              <a:rPr lang="en-GB" baseline="0" dirty="0" err="1"/>
+              <a:t>dropna</a:t>
+            </a:r>
+            <a:r>
+              <a:rPr lang="en-GB" baseline="0" dirty="0"/>
+              <a:t> on all other features.  Finally synthetic data was created to see how creating a dataset as large or small as desired would affect performance.  The concern in these approaches centred around losing key features, or diluting the data to an unusable degree.  If there were too many filled values around the same time as a weather event then the models may rate readings of 0 as significant predictors.</a:t>
             </a:r>
             <a:endParaRPr lang="en-GB" dirty="0"/>
           </a:p>
@@ -1081,7 +1078,7 @@
     </p:spTree>
     <p:extLst>
       <p:ext uri="{BB962C8B-B14F-4D97-AF65-F5344CB8AC3E}">
-        <p14:creationId xmlns:p14="http://schemas.microsoft.com/office/powerpoint/2010/main" val="2411338530"/>
+        <p14:creationId xmlns:p14="http://schemas.microsoft.com/office/powerpoint/2010/main" val="906887884"/>
       </p:ext>
     </p:extLst>
   </p:cSld>
@@ -1137,32 +1134,17 @@
           <a:p>
             <a:r>
               <a:rPr lang="en-GB" dirty="0"/>
-              <a:t>After reading up on the models identified,</a:t>
+              <a:t>To help with addressing all concerns and data sizes, </a:t>
+            </a:r>
+            <a:r>
+              <a:rPr lang="en-GB" dirty="0" err="1"/>
+              <a:t>scikit-learn’s</a:t>
             </a:r>
             <a:r>
               <a:rPr lang="en-GB" baseline="0" dirty="0"/>
-              <a:t> </a:t>
-            </a:r>
-            <a:r>
-              <a:rPr lang="en-GB" dirty="0"/>
-              <a:t>three models selected</a:t>
-            </a:r>
-            <a:r>
-              <a:rPr lang="en-GB" baseline="0" dirty="0"/>
-              <a:t> to run</a:t>
-            </a:r>
-            <a:r>
-              <a:rPr lang="en-GB" dirty="0"/>
-              <a:t> using </a:t>
-            </a:r>
-            <a:r>
-              <a:rPr lang="en-GB" dirty="0" err="1"/>
-              <a:t>GridSearch</a:t>
-            </a:r>
-            <a:r>
-              <a:rPr lang="en-GB" dirty="0"/>
-              <a:t> and a number of parameters.  The pros and cons for each one reinforced the decision.  </a:t>
-            </a:r>
+              <a:t> helpful flowchart of learning algorithms was used.  After following the flow chart the models were researched to decide on which ones would generate the best results.  One particular thing about referring to this chart is the helpful guide on data size as a determining factor of informed model selection.  </a:t>
+            </a:r>
+            <a:endParaRPr lang="en-GB" dirty="0"/>
           </a:p>
         </p:txBody>
       </p:sp>
@@ -1192,7 +1174,7 @@
     </p:spTree>
     <p:extLst>
       <p:ext uri="{BB962C8B-B14F-4D97-AF65-F5344CB8AC3E}">
-        <p14:creationId xmlns:p14="http://schemas.microsoft.com/office/powerpoint/2010/main" val="3206178365"/>
+        <p14:creationId xmlns:p14="http://schemas.microsoft.com/office/powerpoint/2010/main" val="2411338530"/>
       </p:ext>
     </p:extLst>
   </p:cSld>
@@ -1248,45 +1230,32 @@
           <a:p>
             <a:r>
               <a:rPr lang="en-GB" dirty="0"/>
-              <a:t>Results determined using </a:t>
+              <a:t>After reading up on the models identified,</a:t>
+            </a:r>
+            <a:r>
+              <a:rPr lang="en-GB" baseline="0" dirty="0"/>
+              <a:t> </a:t>
+            </a:r>
+            <a:r>
+              <a:rPr lang="en-GB" dirty="0"/>
+              <a:t>three models selected</a:t>
+            </a:r>
+            <a:r>
+              <a:rPr lang="en-GB" baseline="0" dirty="0"/>
+              <a:t> to run</a:t>
+            </a:r>
+            <a:r>
+              <a:rPr lang="en-GB" dirty="0"/>
+              <a:t> using </a:t>
             </a:r>
             <a:r>
               <a:rPr lang="en-GB" dirty="0" err="1"/>
-              <a:t>skLearn’s</a:t>
+              <a:t>GridSearch</a:t>
             </a:r>
             <a:r>
               <a:rPr lang="en-GB" dirty="0"/>
-              <a:t> accuracy score which is determined</a:t>
-            </a:r>
-            <a:r>
-              <a:rPr lang="en-GB" baseline="0" dirty="0"/>
-              <a:t> as </a:t>
-            </a:r>
-            <a:r>
-              <a:rPr lang="en-GB" baseline="0" dirty="0" err="1"/>
-              <a:t>correct_matches</a:t>
-            </a:r>
-            <a:r>
-              <a:rPr lang="en-GB" baseline="0" dirty="0"/>
-              <a:t>/samples.  Synthetic data produced the best results using </a:t>
-            </a:r>
-            <a:r>
-              <a:rPr lang="en-GB" baseline="0" dirty="0" err="1"/>
-              <a:t>adaboost</a:t>
-            </a:r>
-            <a:r>
-              <a:rPr lang="en-GB" baseline="0" dirty="0"/>
-              <a:t>, however using gaussian naïve </a:t>
-            </a:r>
-            <a:r>
-              <a:rPr lang="en-GB" baseline="0" dirty="0" err="1"/>
-              <a:t>bayes</a:t>
-            </a:r>
-            <a:r>
-              <a:rPr lang="en-GB" baseline="0" dirty="0"/>
-              <a:t> gave the best results on my pure dataset.  Since a brute force approach to selecting parameters was used, the next step for model improvement would be to improve the data.  Access to data dating back to 2000 for buoys is available, however complete measurements are not available for this time window.  The data is included in the data folder but more measurements should be located for training.</a:t>
-            </a:r>
-            <a:endParaRPr lang="en-GB" dirty="0"/>
+              <a:t> and a number of parameters.  The pros and cons for each one reinforced the decision.  </a:t>
+            </a:r>
           </a:p>
         </p:txBody>
       </p:sp>
@@ -1316,7 +1285,7 @@
     </p:spTree>
     <p:extLst>
       <p:ext uri="{BB962C8B-B14F-4D97-AF65-F5344CB8AC3E}">
-        <p14:creationId xmlns:p14="http://schemas.microsoft.com/office/powerpoint/2010/main" val="2549757428"/>
+        <p14:creationId xmlns:p14="http://schemas.microsoft.com/office/powerpoint/2010/main" val="3206178365"/>
       </p:ext>
     </p:extLst>
   </p:cSld>
@@ -1372,27 +1341,43 @@
           <a:p>
             <a:r>
               <a:rPr lang="en-GB" dirty="0"/>
-              <a:t>After running</a:t>
+              <a:t>Results determined using </a:t>
+            </a:r>
+            <a:r>
+              <a:rPr lang="en-GB" dirty="0" err="1"/>
+              <a:t>skLearn’s</a:t>
+            </a:r>
+            <a:r>
+              <a:rPr lang="en-GB" dirty="0"/>
+              <a:t> accuracy score which is determined</a:t>
             </a:r>
             <a:r>
               <a:rPr lang="en-GB" baseline="0" dirty="0"/>
-              <a:t> models, </a:t>
+              <a:t> as </a:t>
             </a:r>
             <a:r>
               <a:rPr lang="en-GB" baseline="0" dirty="0" err="1"/>
-              <a:t>scikit-learn’s</a:t>
+              <a:t>correct_matches</a:t>
             </a:r>
             <a:r>
               <a:rPr lang="en-GB" baseline="0" dirty="0"/>
-              <a:t> principal component analysis was used on the </a:t>
+              <a:t>/samples.  Synthetic data produced the best results using </a:t>
             </a:r>
             <a:r>
               <a:rPr lang="en-GB" baseline="0" dirty="0" err="1"/>
-              <a:t>sBest</a:t>
+              <a:t>adaboost</a:t>
             </a:r>
             <a:r>
               <a:rPr lang="en-GB" baseline="0" dirty="0"/>
-              <a:t> data set (which was all real data) to determine what the most important features were.  The values for all of the predictors were examined to determine which five values best captured variance within the data.  These five predictors account for 95 percent of total data variance.</a:t>
+              <a:t>, however using gaussian naïve </a:t>
+            </a:r>
+            <a:r>
+              <a:rPr lang="en-GB" baseline="0" dirty="0" err="1"/>
+              <a:t>bayes</a:t>
+            </a:r>
+            <a:r>
+              <a:rPr lang="en-GB" baseline="0" dirty="0"/>
+              <a:t> gave the best results on my pure dataset.  Since a brute force approach to selecting parameters was used, the next step for model improvement would be to improve the data.  Access to data dating back to 2000 for buoys is available, however complete measurements are not available for this time window.  The data is included in the data folder but more measurements should be located for training.</a:t>
             </a:r>
             <a:endParaRPr lang="en-GB" dirty="0"/>
           </a:p>
@@ -1424,7 +1409,7 @@
     </p:spTree>
     <p:extLst>
       <p:ext uri="{BB962C8B-B14F-4D97-AF65-F5344CB8AC3E}">
-        <p14:creationId xmlns:p14="http://schemas.microsoft.com/office/powerpoint/2010/main" val="3637249342"/>
+        <p14:creationId xmlns:p14="http://schemas.microsoft.com/office/powerpoint/2010/main" val="2549757428"/>
       </p:ext>
     </p:extLst>
   </p:cSld>
@@ -1480,11 +1465,27 @@
           <a:p>
             <a:r>
               <a:rPr lang="en-GB" dirty="0"/>
-              <a:t>To continue this work additional</a:t>
+              <a:t>After running</a:t>
             </a:r>
             <a:r>
               <a:rPr lang="en-GB" baseline="0" dirty="0"/>
-              <a:t> data should be collected.  Data from buoys off the African coast may prove to be particularly useful since confirmed rogue waves have occurred there.  The five principal components also deserve a closer look when considering other weather and ocean anomalies.  Finally, a larger data set would make other models available for predictions.  Some of these models may still outperform the three that were a focus for this work.</a:t>
+              <a:t> models, </a:t>
+            </a:r>
+            <a:r>
+              <a:rPr lang="en-GB" baseline="0" dirty="0" err="1"/>
+              <a:t>scikit-learn’s</a:t>
+            </a:r>
+            <a:r>
+              <a:rPr lang="en-GB" baseline="0" dirty="0"/>
+              <a:t> principal component analysis was used on the </a:t>
+            </a:r>
+            <a:r>
+              <a:rPr lang="en-GB" baseline="0" dirty="0" err="1"/>
+              <a:t>sBest</a:t>
+            </a:r>
+            <a:r>
+              <a:rPr lang="en-GB" baseline="0" dirty="0"/>
+              <a:t> data set (which was all real data) to determine what the most important features were.  The values for all of the predictors were examined to determine which five values best captured variance within the data.  These five predictors account for 95 percent of total data variance.</a:t>
             </a:r>
             <a:endParaRPr lang="en-GB" dirty="0"/>
           </a:p>
@@ -1508,6 +1509,98 @@
             <a:fld id="{F93199CD-3E1B-4AE6-990F-76F925F5EA9F}" type="slidenum">
               <a:rPr lang="en-US" smtClean="0"/>
               <a:t>16</a:t>
+            </a:fld>
+            <a:endParaRPr lang="en-US"/>
+          </a:p>
+        </p:txBody>
+      </p:sp>
+    </p:spTree>
+    <p:extLst>
+      <p:ext uri="{BB962C8B-B14F-4D97-AF65-F5344CB8AC3E}">
+        <p14:creationId xmlns:p14="http://schemas.microsoft.com/office/powerpoint/2010/main" val="3637249342"/>
+      </p:ext>
+    </p:extLst>
+  </p:cSld>
+  <p:clrMapOvr>
+    <a:masterClrMapping/>
+  </p:clrMapOvr>
+</p:notes>
+</file>
+
+<file path=ppt/notesSlides/notesSlide17.xml><?xml version="1.0" encoding="utf-8"?>
+<p:notes xmlns:a="http://schemas.openxmlformats.org/drawingml/2006/main" xmlns:r="http://schemas.openxmlformats.org/officeDocument/2006/relationships" xmlns:p="http://schemas.openxmlformats.org/presentationml/2006/main">
+  <p:cSld>
+    <p:spTree>
+      <p:nvGrpSpPr>
+        <p:cNvPr id="1" name=""/>
+        <p:cNvGrpSpPr/>
+        <p:nvPr/>
+      </p:nvGrpSpPr>
+      <p:grpSpPr>
+        <a:xfrm>
+          <a:off x="0" y="0"/>
+          <a:ext cx="0" cy="0"/>
+          <a:chOff x="0" y="0"/>
+          <a:chExt cx="0" cy="0"/>
+        </a:xfrm>
+      </p:grpSpPr>
+      <p:sp>
+        <p:nvSpPr>
+          <p:cNvPr id="2" name="Slide Image Placeholder 1"/>
+          <p:cNvSpPr>
+            <a:spLocks noGrp="1" noRot="1" noChangeAspect="1"/>
+          </p:cNvSpPr>
+          <p:nvPr>
+            <p:ph type="sldImg"/>
+          </p:nvPr>
+        </p:nvSpPr>
+        <p:spPr/>
+      </p:sp>
+      <p:sp>
+        <p:nvSpPr>
+          <p:cNvPr id="3" name="Notes Placeholder 2"/>
+          <p:cNvSpPr>
+            <a:spLocks noGrp="1"/>
+          </p:cNvSpPr>
+          <p:nvPr>
+            <p:ph type="body" idx="1"/>
+          </p:nvPr>
+        </p:nvSpPr>
+        <p:spPr/>
+        <p:txBody>
+          <a:bodyPr/>
+          <a:lstStyle/>
+          <a:p>
+            <a:r>
+              <a:rPr lang="en-GB" dirty="0"/>
+              <a:t>To continue this work additional</a:t>
+            </a:r>
+            <a:r>
+              <a:rPr lang="en-GB" baseline="0" dirty="0"/>
+              <a:t> data should be collected.  Data from buoys off the African coast may prove to be particularly useful since confirmed rogue waves have occurred there.  The five principal components also deserve a closer look when considering other weather and ocean anomalies.  Finally, a larger data set would make other models available for predictions.  Some of these models may still outperform the three that were a focus for this work.</a:t>
+            </a:r>
+            <a:endParaRPr lang="en-GB" dirty="0"/>
+          </a:p>
+        </p:txBody>
+      </p:sp>
+      <p:sp>
+        <p:nvSpPr>
+          <p:cNvPr id="4" name="Slide Number Placeholder 3"/>
+          <p:cNvSpPr>
+            <a:spLocks noGrp="1"/>
+          </p:cNvSpPr>
+          <p:nvPr>
+            <p:ph type="sldNum" sz="quarter" idx="5"/>
+          </p:nvPr>
+        </p:nvSpPr>
+        <p:spPr/>
+        <p:txBody>
+          <a:bodyPr/>
+          <a:lstStyle/>
+          <a:p>
+            <a:fld id="{F93199CD-3E1B-4AE6-990F-76F925F5EA9F}" type="slidenum">
+              <a:rPr lang="en-US" smtClean="0"/>
+              <a:t>17</a:t>
             </a:fld>
             <a:endParaRPr lang="en-US"/>
           </a:p>
@@ -2730,7 +2823,7 @@
           <a:p>
             <a:fld id="{3A713B6B-E340-4FC0-A085-B71A4639D1AA}" type="datetime1">
               <a:rPr lang="en-US" smtClean="0"/>
-              <a:t>12/9/2019</a:t>
+              <a:t>12/11/2019</a:t>
             </a:fld>
             <a:endParaRPr/>
           </a:p>
@@ -2926,7 +3019,7 @@
           <a:p>
             <a:fld id="{FDCB42DF-42F7-4DF8-92F8-78154BDE12B4}" type="datetime1">
               <a:rPr lang="en-US" smtClean="0"/>
-              <a:t>12/9/2019</a:t>
+              <a:t>12/11/2019</a:t>
             </a:fld>
             <a:endParaRPr/>
           </a:p>
@@ -3129,7 +3222,7 @@
           <a:p>
             <a:fld id="{A43FAFC5-F11C-4205-99FD-FC66DAA2AE2D}" type="datetime1">
               <a:rPr lang="en-US" smtClean="0"/>
-              <a:t>12/9/2019</a:t>
+              <a:t>12/11/2019</a:t>
             </a:fld>
             <a:endParaRPr/>
           </a:p>
@@ -3423,7 +3516,7 @@
           <a:p>
             <a:fld id="{A43FAFC5-F11C-4205-99FD-FC66DAA2AE2D}" type="datetime1">
               <a:rPr lang="en-US" smtClean="0"/>
-              <a:t>12/9/2019</a:t>
+              <a:t>12/11/2019</a:t>
             </a:fld>
             <a:endParaRPr/>
           </a:p>
@@ -3731,7 +3824,7 @@
           <a:p>
             <a:fld id="{EFD82905-3DC5-49B9-B8B8-9D80D3609DB5}" type="datetime1">
               <a:rPr lang="en-US" smtClean="0"/>
-              <a:t>12/9/2019</a:t>
+              <a:t>12/11/2019</a:t>
             </a:fld>
             <a:endParaRPr/>
           </a:p>
@@ -4191,7 +4284,7 @@
           <a:p>
             <a:fld id="{59825298-A6F6-4AF2-832C-941EFA52AF9B}" type="datetime1">
               <a:rPr lang="en-US" smtClean="0"/>
-              <a:t>12/9/2019</a:t>
+              <a:t>12/11/2019</a:t>
             </a:fld>
             <a:endParaRPr/>
           </a:p>
@@ -4325,7 +4418,7 @@
           <a:p>
             <a:fld id="{91EE3D8C-3438-4368-AD19-D5CB0C52B1DD}" type="datetime1">
               <a:rPr lang="en-US" smtClean="0"/>
-              <a:t>12/9/2019</a:t>
+              <a:t>12/11/2019</a:t>
             </a:fld>
             <a:endParaRPr/>
           </a:p>
@@ -4466,7 +4559,7 @@
           <a:p>
             <a:fld id="{5A41D785-D6D8-40F1-B2DD-0E2019A27A22}" type="datetime1">
               <a:rPr lang="en-US" smtClean="0"/>
-              <a:t>12/9/2019</a:t>
+              <a:t>12/11/2019</a:t>
             </a:fld>
             <a:endParaRPr/>
           </a:p>
@@ -4778,7 +4871,7 @@
           <a:p>
             <a:fld id="{C05A9A06-02F9-41CB-8208-185A65D60B96}" type="datetime1">
               <a:rPr lang="en-US" smtClean="0"/>
-              <a:t>12/9/2019</a:t>
+              <a:t>12/11/2019</a:t>
             </a:fld>
             <a:endParaRPr/>
           </a:p>
@@ -5121,7 +5214,7 @@
           <a:p>
             <a:fld id="{3E2E051B-B340-4A72-AC7D-8FDFBF03EE12}" type="datetime1">
               <a:rPr lang="en-US" smtClean="0"/>
-              <a:t>12/9/2019</a:t>
+              <a:t>12/11/2019</a:t>
             </a:fld>
             <a:endParaRPr/>
           </a:p>
@@ -5492,7 +5585,7 @@
             <a:fld id="{6B85D658-8C58-46F3-AA54-0ED74F8B4CDC}" type="datetime1">
               <a:rPr lang="en-US" smtClean="0"/>
               <a:pPr/>
-              <a:t>12/9/2019</a:t>
+              <a:t>12/11/2019</a:t>
             </a:fld>
             <a:endParaRPr lang="en-US" dirty="0"/>
           </a:p>
@@ -5994,271 +6087,46 @@
           <a:chExt cx="0" cy="0"/>
         </a:xfrm>
       </p:grpSpPr>
-      <p:sp>
-        <p:nvSpPr>
-          <p:cNvPr id="2" name="Title 1"/>
-          <p:cNvSpPr>
-            <a:spLocks noGrp="1"/>
-          </p:cNvSpPr>
-          <p:nvPr>
-            <p:ph type="title"/>
-          </p:nvPr>
-        </p:nvSpPr>
-        <p:spPr/>
-        <p:txBody>
-          <a:bodyPr/>
-          <a:lstStyle/>
-          <a:p>
-            <a:r>
-              <a:rPr lang="en-US" dirty="0">
-                <a:latin typeface="Frutiger 55 Roman" panose="020B0800000000000000" pitchFamily="34" charset="0"/>
-              </a:rPr>
-              <a:t>Features</a:t>
-            </a:r>
-          </a:p>
-        </p:txBody>
-      </p:sp>
-      <p:sp>
-        <p:nvSpPr>
-          <p:cNvPr id="3" name="TextBox 2">
+      <p:pic>
+        <p:nvPicPr>
+          <p:cNvPr id="3" name="Picture 2" descr="A picture containing toy&#10;&#10;Description automatically generated">
             <a:extLst>
               <a:ext uri="{FF2B5EF4-FFF2-40B4-BE49-F238E27FC236}">
-                <a16:creationId xmlns:a16="http://schemas.microsoft.com/office/drawing/2014/main" id="{F46D929D-AC90-4AB3-9BD5-E6D5D196AEE4}"/>
+                <a16:creationId xmlns:a16="http://schemas.microsoft.com/office/drawing/2014/main" id="{6D9E55B0-AA08-4F86-9FB9-2CBD2BC857D3}"/>
               </a:ext>
             </a:extLst>
           </p:cNvPr>
-          <p:cNvSpPr txBox="1"/>
+          <p:cNvPicPr>
+            <a:picLocks noChangeAspect="1"/>
+          </p:cNvPicPr>
           <p:nvPr/>
-        </p:nvSpPr>
+        </p:nvPicPr>
+        <p:blipFill>
+          <a:blip r:embed="rId3">
+            <a:extLst>
+              <a:ext uri="{28A0092B-C50C-407E-A947-70E740481C1C}">
+                <a14:useLocalDpi xmlns:a14="http://schemas.microsoft.com/office/drawing/2010/main" val="0"/>
+              </a:ext>
+            </a:extLst>
+          </a:blip>
+          <a:stretch>
+            <a:fillRect/>
+          </a:stretch>
+        </p:blipFill>
         <p:spPr>
-          <a:xfrm rot="10800000" flipH="1" flipV="1">
-            <a:off x="1629916" y="1981200"/>
-            <a:ext cx="10297144" cy="4524315"/>
+          <a:xfrm>
+            <a:off x="2506478" y="6174"/>
+            <a:ext cx="7175869" cy="6845652"/>
           </a:xfrm>
           <a:prstGeom prst="rect">
             <a:avLst/>
           </a:prstGeom>
-          <a:noFill/>
         </p:spPr>
-        <p:txBody>
-          <a:bodyPr wrap="square" rtlCol="0">
-            <a:spAutoFit/>
-          </a:bodyPr>
-          <a:lstStyle/>
-          <a:p>
-            <a:pPr marL="285750" indent="-285750">
-              <a:buFont typeface="Arial" panose="020B0604020202020204" pitchFamily="34" charset="0"/>
-              <a:buChar char="•"/>
-            </a:pPr>
-            <a:r>
-              <a:rPr lang="en-GB" dirty="0">
-                <a:latin typeface="Frutiger 55 Roman" panose="020B0800000000000000" pitchFamily="34" charset="0"/>
-              </a:rPr>
-              <a:t>Ten Features Dropped due to Sparsity of data</a:t>
-            </a:r>
-          </a:p>
-          <a:p>
-            <a:pPr marL="285750" indent="-285750">
-              <a:buFont typeface="Arial" panose="020B0604020202020204" pitchFamily="34" charset="0"/>
-              <a:buChar char="•"/>
-            </a:pPr>
-            <a:r>
-              <a:rPr lang="en-GB" dirty="0">
-                <a:latin typeface="Frutiger 55 Roman" panose="020B0800000000000000" pitchFamily="34" charset="0"/>
-              </a:rPr>
-              <a:t>Thirteen remaining features</a:t>
-            </a:r>
-          </a:p>
-          <a:p>
-            <a:pPr marL="742950" lvl="1" indent="-285750">
-              <a:buFont typeface="Arial" panose="020B0604020202020204" pitchFamily="34" charset="0"/>
-              <a:buChar char="•"/>
-            </a:pPr>
-            <a:r>
-              <a:rPr lang="en-GB" dirty="0">
-                <a:latin typeface="Frutiger 55 Roman" panose="020B0800000000000000" pitchFamily="34" charset="0"/>
-              </a:rPr>
-              <a:t>Battery</a:t>
-            </a:r>
-          </a:p>
-          <a:p>
-            <a:pPr marL="742950" lvl="1" indent="-285750">
-              <a:buFont typeface="Arial" panose="020B0604020202020204" pitchFamily="34" charset="0"/>
-              <a:buChar char="•"/>
-            </a:pPr>
-            <a:r>
-              <a:rPr lang="en-GB" dirty="0" err="1">
-                <a:latin typeface="Frutiger 55 Roman" panose="020B0800000000000000" pitchFamily="34" charset="0"/>
-              </a:rPr>
-              <a:t>ChlFluor</a:t>
-            </a:r>
-            <a:endParaRPr lang="en-GB" dirty="0">
-              <a:latin typeface="Frutiger 55 Roman" panose="020B0800000000000000" pitchFamily="34" charset="0"/>
-            </a:endParaRPr>
-          </a:p>
-          <a:p>
-            <a:pPr marL="742950" lvl="1" indent="-285750">
-              <a:buFont typeface="Arial" panose="020B0604020202020204" pitchFamily="34" charset="0"/>
-              <a:buChar char="•"/>
-            </a:pPr>
-            <a:r>
-              <a:rPr lang="en-GB" dirty="0" err="1">
-                <a:latin typeface="Frutiger 55 Roman" panose="020B0800000000000000" pitchFamily="34" charset="0"/>
-              </a:rPr>
-              <a:t>DO_mgl</a:t>
-            </a:r>
-            <a:endParaRPr lang="en-GB" dirty="0">
-              <a:latin typeface="Frutiger 55 Roman" panose="020B0800000000000000" pitchFamily="34" charset="0"/>
-            </a:endParaRPr>
-          </a:p>
-          <a:p>
-            <a:pPr marL="742950" lvl="1" indent="-285750">
-              <a:buFont typeface="Arial" panose="020B0604020202020204" pitchFamily="34" charset="0"/>
-              <a:buChar char="•"/>
-            </a:pPr>
-            <a:r>
-              <a:rPr lang="en-GB" dirty="0" err="1">
-                <a:latin typeface="Frutiger 55 Roman" panose="020B0800000000000000" pitchFamily="34" charset="0"/>
-              </a:rPr>
-              <a:t>DO_pct</a:t>
-            </a:r>
-            <a:endParaRPr lang="en-GB" dirty="0">
-              <a:latin typeface="Frutiger 55 Roman" panose="020B0800000000000000" pitchFamily="34" charset="0"/>
-            </a:endParaRPr>
-          </a:p>
-          <a:p>
-            <a:pPr marL="742950" lvl="1" indent="-285750">
-              <a:buFont typeface="Arial" panose="020B0604020202020204" pitchFamily="34" charset="0"/>
-              <a:buChar char="•"/>
-            </a:pPr>
-            <a:r>
-              <a:rPr lang="en-GB" dirty="0">
-                <a:latin typeface="Frutiger 55 Roman" panose="020B0800000000000000" pitchFamily="34" charset="0"/>
-              </a:rPr>
-              <a:t>Depth</a:t>
-            </a:r>
-          </a:p>
-          <a:p>
-            <a:pPr marL="742950" lvl="1" indent="-285750">
-              <a:buFont typeface="Arial" panose="020B0604020202020204" pitchFamily="34" charset="0"/>
-              <a:buChar char="•"/>
-            </a:pPr>
-            <a:r>
-              <a:rPr lang="en-GB" dirty="0">
-                <a:latin typeface="Frutiger 55 Roman" panose="020B0800000000000000" pitchFamily="34" charset="0"/>
-              </a:rPr>
-              <a:t>Sal</a:t>
-            </a:r>
-          </a:p>
-          <a:p>
-            <a:pPr marL="742950" lvl="1" indent="-285750">
-              <a:buFont typeface="Arial" panose="020B0604020202020204" pitchFamily="34" charset="0"/>
-              <a:buChar char="•"/>
-            </a:pPr>
-            <a:r>
-              <a:rPr lang="en-GB" dirty="0" err="1">
-                <a:latin typeface="Frutiger 55 Roman" panose="020B0800000000000000" pitchFamily="34" charset="0"/>
-              </a:rPr>
-              <a:t>SpCond</a:t>
-            </a:r>
-            <a:endParaRPr lang="en-GB" dirty="0">
-              <a:latin typeface="Frutiger 55 Roman" panose="020B0800000000000000" pitchFamily="34" charset="0"/>
-            </a:endParaRPr>
-          </a:p>
-          <a:p>
-            <a:pPr marL="742950" lvl="1" indent="-285750">
-              <a:buFont typeface="Arial" panose="020B0604020202020204" pitchFamily="34" charset="0"/>
-              <a:buChar char="•"/>
-            </a:pPr>
-            <a:r>
-              <a:rPr lang="en-GB" dirty="0">
-                <a:latin typeface="Frutiger 55 Roman" panose="020B0800000000000000" pitchFamily="34" charset="0"/>
-              </a:rPr>
-              <a:t>Temp</a:t>
-            </a:r>
-          </a:p>
-          <a:p>
-            <a:pPr marL="742950" lvl="1" indent="-285750">
-              <a:buFont typeface="Arial" panose="020B0604020202020204" pitchFamily="34" charset="0"/>
-              <a:buChar char="•"/>
-            </a:pPr>
-            <a:r>
-              <a:rPr lang="en-GB" dirty="0">
-                <a:latin typeface="Frutiger 55 Roman" panose="020B0800000000000000" pitchFamily="34" charset="0"/>
-              </a:rPr>
-              <a:t>Time</a:t>
-            </a:r>
-          </a:p>
-          <a:p>
-            <a:pPr marL="742950" lvl="1" indent="-285750">
-              <a:buFont typeface="Arial" panose="020B0604020202020204" pitchFamily="34" charset="0"/>
-              <a:buChar char="•"/>
-            </a:pPr>
-            <a:r>
-              <a:rPr lang="en-GB" dirty="0" err="1">
-                <a:latin typeface="Frutiger 55 Roman" panose="020B0800000000000000" pitchFamily="34" charset="0"/>
-              </a:rPr>
-              <a:t>Turb</a:t>
-            </a:r>
-            <a:endParaRPr lang="en-GB" dirty="0">
-              <a:latin typeface="Frutiger 55 Roman" panose="020B0800000000000000" pitchFamily="34" charset="0"/>
-            </a:endParaRPr>
-          </a:p>
-          <a:p>
-            <a:pPr marL="742950" lvl="1" indent="-285750">
-              <a:buFont typeface="Arial" panose="020B0604020202020204" pitchFamily="34" charset="0"/>
-              <a:buChar char="•"/>
-            </a:pPr>
-            <a:r>
-              <a:rPr lang="en-GB" dirty="0" err="1">
-                <a:latin typeface="Frutiger 55 Roman" panose="020B0800000000000000" pitchFamily="34" charset="0"/>
-              </a:rPr>
-              <a:t>VertPosm</a:t>
-            </a:r>
-            <a:endParaRPr lang="en-GB" dirty="0">
-              <a:latin typeface="Frutiger 55 Roman" panose="020B0800000000000000" pitchFamily="34" charset="0"/>
-            </a:endParaRPr>
-          </a:p>
-          <a:p>
-            <a:pPr marL="742950" lvl="1" indent="-285750">
-              <a:buFont typeface="Arial" panose="020B0604020202020204" pitchFamily="34" charset="0"/>
-              <a:buChar char="•"/>
-            </a:pPr>
-            <a:r>
-              <a:rPr lang="en-GB" dirty="0">
-                <a:latin typeface="Frutiger 55 Roman" panose="020B0800000000000000" pitchFamily="34" charset="0"/>
-              </a:rPr>
-              <a:t>pH</a:t>
-            </a:r>
-          </a:p>
-          <a:p>
-            <a:pPr marL="742950" lvl="1" indent="-285750">
-              <a:buFont typeface="Arial" panose="020B0604020202020204" pitchFamily="34" charset="0"/>
-              <a:buChar char="•"/>
-            </a:pPr>
-            <a:r>
-              <a:rPr lang="en-GB" dirty="0" err="1">
-                <a:latin typeface="Frutiger 55 Roman" panose="020B0800000000000000" pitchFamily="34" charset="0"/>
-              </a:rPr>
-              <a:t>pHmV</a:t>
-            </a:r>
-            <a:endParaRPr lang="en-GB" dirty="0">
-              <a:latin typeface="Frutiger 55 Roman" panose="020B0800000000000000" pitchFamily="34" charset="0"/>
-            </a:endParaRPr>
-          </a:p>
-          <a:p>
-            <a:pPr marL="742950" lvl="1" indent="-285750">
-              <a:buFont typeface="Arial" panose="020B0604020202020204" pitchFamily="34" charset="0"/>
-              <a:buChar char="•"/>
-            </a:pPr>
-            <a:endParaRPr lang="en-GB" dirty="0"/>
-          </a:p>
-        </p:txBody>
-      </p:sp>
+      </p:pic>
     </p:spTree>
     <p:extLst>
       <p:ext uri="{BB962C8B-B14F-4D97-AF65-F5344CB8AC3E}">
-        <p14:creationId xmlns:p14="http://schemas.microsoft.com/office/powerpoint/2010/main" val="1744096041"/>
+        <p14:creationId xmlns:p14="http://schemas.microsoft.com/office/powerpoint/2010/main" val="1330548102"/>
       </p:ext>
     </p:extLst>
   </p:cSld>
@@ -6316,6 +6184,309 @@
               <a:rPr lang="en-US" dirty="0">
                 <a:latin typeface="Frutiger 55 Roman" panose="020B0800000000000000" pitchFamily="34" charset="0"/>
               </a:rPr>
+              <a:t>Features</a:t>
+            </a:r>
+          </a:p>
+        </p:txBody>
+      </p:sp>
+      <p:sp>
+        <p:nvSpPr>
+          <p:cNvPr id="3" name="TextBox 2">
+            <a:extLst>
+              <a:ext uri="{FF2B5EF4-FFF2-40B4-BE49-F238E27FC236}">
+                <a16:creationId xmlns:a16="http://schemas.microsoft.com/office/drawing/2014/main" id="{F46D929D-AC90-4AB3-9BD5-E6D5D196AEE4}"/>
+              </a:ext>
+            </a:extLst>
+          </p:cNvPr>
+          <p:cNvSpPr txBox="1"/>
+          <p:nvPr/>
+        </p:nvSpPr>
+        <p:spPr>
+          <a:xfrm rot="10800000" flipH="1" flipV="1">
+            <a:off x="1629916" y="1981200"/>
+            <a:ext cx="10297144" cy="4524315"/>
+          </a:xfrm>
+          <a:prstGeom prst="rect">
+            <a:avLst/>
+          </a:prstGeom>
+          <a:noFill/>
+        </p:spPr>
+        <p:txBody>
+          <a:bodyPr wrap="square" rtlCol="0">
+            <a:spAutoFit/>
+          </a:bodyPr>
+          <a:lstStyle/>
+          <a:p>
+            <a:pPr marL="285750" indent="-285750">
+              <a:buFont typeface="Arial" panose="020B0604020202020204" pitchFamily="34" charset="0"/>
+              <a:buChar char="•"/>
+            </a:pPr>
+            <a:r>
+              <a:rPr lang="en-GB" dirty="0">
+                <a:latin typeface="Frutiger 55 Roman" panose="020B0800000000000000" pitchFamily="34" charset="0"/>
+              </a:rPr>
+              <a:t>Ten Features Dropped due to Sparsity of data</a:t>
+            </a:r>
+          </a:p>
+          <a:p>
+            <a:pPr marL="285750" indent="-285750">
+              <a:buFont typeface="Arial" panose="020B0604020202020204" pitchFamily="34" charset="0"/>
+              <a:buChar char="•"/>
+            </a:pPr>
+            <a:r>
+              <a:rPr lang="en-GB" dirty="0">
+                <a:latin typeface="Frutiger 55 Roman" panose="020B0800000000000000" pitchFamily="34" charset="0"/>
+              </a:rPr>
+              <a:t>Thirteen remaining features</a:t>
+            </a:r>
+          </a:p>
+          <a:p>
+            <a:pPr marL="742950" lvl="1" indent="-285750">
+              <a:buFont typeface="Arial" panose="020B0604020202020204" pitchFamily="34" charset="0"/>
+              <a:buChar char="•"/>
+            </a:pPr>
+            <a:r>
+              <a:rPr lang="en-GB" dirty="0">
+                <a:latin typeface="Frutiger 55 Roman" panose="020B0800000000000000" pitchFamily="34" charset="0"/>
+              </a:rPr>
+              <a:t>Battery</a:t>
+            </a:r>
+          </a:p>
+          <a:p>
+            <a:pPr marL="742950" lvl="1" indent="-285750">
+              <a:buFont typeface="Arial" panose="020B0604020202020204" pitchFamily="34" charset="0"/>
+              <a:buChar char="•"/>
+            </a:pPr>
+            <a:r>
+              <a:rPr lang="en-GB" dirty="0" err="1">
+                <a:latin typeface="Frutiger 55 Roman" panose="020B0800000000000000" pitchFamily="34" charset="0"/>
+              </a:rPr>
+              <a:t>ChlFluor</a:t>
+            </a:r>
+            <a:endParaRPr lang="en-GB" dirty="0">
+              <a:latin typeface="Frutiger 55 Roman" panose="020B0800000000000000" pitchFamily="34" charset="0"/>
+            </a:endParaRPr>
+          </a:p>
+          <a:p>
+            <a:pPr marL="742950" lvl="1" indent="-285750">
+              <a:buFont typeface="Arial" panose="020B0604020202020204" pitchFamily="34" charset="0"/>
+              <a:buChar char="•"/>
+            </a:pPr>
+            <a:r>
+              <a:rPr lang="en-GB" dirty="0" err="1">
+                <a:latin typeface="Frutiger 55 Roman" panose="020B0800000000000000" pitchFamily="34" charset="0"/>
+              </a:rPr>
+              <a:t>DO_mgl</a:t>
+            </a:r>
+            <a:endParaRPr lang="en-GB" dirty="0">
+              <a:latin typeface="Frutiger 55 Roman" panose="020B0800000000000000" pitchFamily="34" charset="0"/>
+            </a:endParaRPr>
+          </a:p>
+          <a:p>
+            <a:pPr marL="742950" lvl="1" indent="-285750">
+              <a:buFont typeface="Arial" panose="020B0604020202020204" pitchFamily="34" charset="0"/>
+              <a:buChar char="•"/>
+            </a:pPr>
+            <a:r>
+              <a:rPr lang="en-GB" dirty="0" err="1">
+                <a:latin typeface="Frutiger 55 Roman" panose="020B0800000000000000" pitchFamily="34" charset="0"/>
+              </a:rPr>
+              <a:t>DO_pct</a:t>
+            </a:r>
+            <a:endParaRPr lang="en-GB" dirty="0">
+              <a:latin typeface="Frutiger 55 Roman" panose="020B0800000000000000" pitchFamily="34" charset="0"/>
+            </a:endParaRPr>
+          </a:p>
+          <a:p>
+            <a:pPr marL="742950" lvl="1" indent="-285750">
+              <a:buFont typeface="Arial" panose="020B0604020202020204" pitchFamily="34" charset="0"/>
+              <a:buChar char="•"/>
+            </a:pPr>
+            <a:r>
+              <a:rPr lang="en-GB" dirty="0">
+                <a:latin typeface="Frutiger 55 Roman" panose="020B0800000000000000" pitchFamily="34" charset="0"/>
+              </a:rPr>
+              <a:t>Depth</a:t>
+            </a:r>
+          </a:p>
+          <a:p>
+            <a:pPr marL="742950" lvl="1" indent="-285750">
+              <a:buFont typeface="Arial" panose="020B0604020202020204" pitchFamily="34" charset="0"/>
+              <a:buChar char="•"/>
+            </a:pPr>
+            <a:r>
+              <a:rPr lang="en-GB" dirty="0">
+                <a:latin typeface="Frutiger 55 Roman" panose="020B0800000000000000" pitchFamily="34" charset="0"/>
+              </a:rPr>
+              <a:t>Sal</a:t>
+            </a:r>
+          </a:p>
+          <a:p>
+            <a:pPr marL="742950" lvl="1" indent="-285750">
+              <a:buFont typeface="Arial" panose="020B0604020202020204" pitchFamily="34" charset="0"/>
+              <a:buChar char="•"/>
+            </a:pPr>
+            <a:r>
+              <a:rPr lang="en-GB" dirty="0" err="1">
+                <a:latin typeface="Frutiger 55 Roman" panose="020B0800000000000000" pitchFamily="34" charset="0"/>
+              </a:rPr>
+              <a:t>SpCond</a:t>
+            </a:r>
+            <a:endParaRPr lang="en-GB" dirty="0">
+              <a:latin typeface="Frutiger 55 Roman" panose="020B0800000000000000" pitchFamily="34" charset="0"/>
+            </a:endParaRPr>
+          </a:p>
+          <a:p>
+            <a:pPr marL="742950" lvl="1" indent="-285750">
+              <a:buFont typeface="Arial" panose="020B0604020202020204" pitchFamily="34" charset="0"/>
+              <a:buChar char="•"/>
+            </a:pPr>
+            <a:r>
+              <a:rPr lang="en-GB" dirty="0">
+                <a:latin typeface="Frutiger 55 Roman" panose="020B0800000000000000" pitchFamily="34" charset="0"/>
+              </a:rPr>
+              <a:t>Temp</a:t>
+            </a:r>
+          </a:p>
+          <a:p>
+            <a:pPr marL="742950" lvl="1" indent="-285750">
+              <a:buFont typeface="Arial" panose="020B0604020202020204" pitchFamily="34" charset="0"/>
+              <a:buChar char="•"/>
+            </a:pPr>
+            <a:r>
+              <a:rPr lang="en-GB" dirty="0">
+                <a:latin typeface="Frutiger 55 Roman" panose="020B0800000000000000" pitchFamily="34" charset="0"/>
+              </a:rPr>
+              <a:t>Time</a:t>
+            </a:r>
+          </a:p>
+          <a:p>
+            <a:pPr marL="742950" lvl="1" indent="-285750">
+              <a:buFont typeface="Arial" panose="020B0604020202020204" pitchFamily="34" charset="0"/>
+              <a:buChar char="•"/>
+            </a:pPr>
+            <a:r>
+              <a:rPr lang="en-GB" dirty="0" err="1">
+                <a:latin typeface="Frutiger 55 Roman" panose="020B0800000000000000" pitchFamily="34" charset="0"/>
+              </a:rPr>
+              <a:t>Turb</a:t>
+            </a:r>
+            <a:endParaRPr lang="en-GB" dirty="0">
+              <a:latin typeface="Frutiger 55 Roman" panose="020B0800000000000000" pitchFamily="34" charset="0"/>
+            </a:endParaRPr>
+          </a:p>
+          <a:p>
+            <a:pPr marL="742950" lvl="1" indent="-285750">
+              <a:buFont typeface="Arial" panose="020B0604020202020204" pitchFamily="34" charset="0"/>
+              <a:buChar char="•"/>
+            </a:pPr>
+            <a:r>
+              <a:rPr lang="en-GB" dirty="0" err="1">
+                <a:latin typeface="Frutiger 55 Roman" panose="020B0800000000000000" pitchFamily="34" charset="0"/>
+              </a:rPr>
+              <a:t>VertPosm</a:t>
+            </a:r>
+            <a:endParaRPr lang="en-GB" dirty="0">
+              <a:latin typeface="Frutiger 55 Roman" panose="020B0800000000000000" pitchFamily="34" charset="0"/>
+            </a:endParaRPr>
+          </a:p>
+          <a:p>
+            <a:pPr marL="742950" lvl="1" indent="-285750">
+              <a:buFont typeface="Arial" panose="020B0604020202020204" pitchFamily="34" charset="0"/>
+              <a:buChar char="•"/>
+            </a:pPr>
+            <a:r>
+              <a:rPr lang="en-GB" dirty="0">
+                <a:latin typeface="Frutiger 55 Roman" panose="020B0800000000000000" pitchFamily="34" charset="0"/>
+              </a:rPr>
+              <a:t>pH</a:t>
+            </a:r>
+          </a:p>
+          <a:p>
+            <a:pPr marL="742950" lvl="1" indent="-285750">
+              <a:buFont typeface="Arial" panose="020B0604020202020204" pitchFamily="34" charset="0"/>
+              <a:buChar char="•"/>
+            </a:pPr>
+            <a:r>
+              <a:rPr lang="en-GB" dirty="0" err="1">
+                <a:latin typeface="Frutiger 55 Roman" panose="020B0800000000000000" pitchFamily="34" charset="0"/>
+              </a:rPr>
+              <a:t>pHmV</a:t>
+            </a:r>
+            <a:endParaRPr lang="en-GB" dirty="0">
+              <a:latin typeface="Frutiger 55 Roman" panose="020B0800000000000000" pitchFamily="34" charset="0"/>
+            </a:endParaRPr>
+          </a:p>
+          <a:p>
+            <a:pPr marL="742950" lvl="1" indent="-285750">
+              <a:buFont typeface="Arial" panose="020B0604020202020204" pitchFamily="34" charset="0"/>
+              <a:buChar char="•"/>
+            </a:pPr>
+            <a:endParaRPr lang="en-GB" dirty="0"/>
+          </a:p>
+        </p:txBody>
+      </p:sp>
+    </p:spTree>
+    <p:extLst>
+      <p:ext uri="{BB962C8B-B14F-4D97-AF65-F5344CB8AC3E}">
+        <p14:creationId xmlns:p14="http://schemas.microsoft.com/office/powerpoint/2010/main" val="1744096041"/>
+      </p:ext>
+    </p:extLst>
+  </p:cSld>
+  <p:clrMapOvr>
+    <a:masterClrMapping/>
+  </p:clrMapOvr>
+  <mc:AlternateContent xmlns:mc="http://schemas.openxmlformats.org/markup-compatibility/2006" xmlns:p14="http://schemas.microsoft.com/office/powerpoint/2010/main">
+    <mc:Choice Requires="p14">
+      <p:transition spd="med" p14:dur="700">
+        <p:fade/>
+      </p:transition>
+    </mc:Choice>
+    <mc:Fallback xmlns="">
+      <p:transition spd="med">
+        <p:fade/>
+      </p:transition>
+    </mc:Fallback>
+  </mc:AlternateContent>
+</p:sld>
+</file>
+
+<file path=ppt/slides/slide12.xml><?xml version="1.0" encoding="utf-8"?>
+<p:sld xmlns:a="http://schemas.openxmlformats.org/drawingml/2006/main" xmlns:r="http://schemas.openxmlformats.org/officeDocument/2006/relationships" xmlns:p="http://schemas.openxmlformats.org/presentationml/2006/main">
+  <p:cSld>
+    <p:spTree>
+      <p:nvGrpSpPr>
+        <p:cNvPr id="1" name=""/>
+        <p:cNvGrpSpPr/>
+        <p:nvPr/>
+      </p:nvGrpSpPr>
+      <p:grpSpPr>
+        <a:xfrm>
+          <a:off x="0" y="0"/>
+          <a:ext cx="0" cy="0"/>
+          <a:chOff x="0" y="0"/>
+          <a:chExt cx="0" cy="0"/>
+        </a:xfrm>
+      </p:grpSpPr>
+      <p:sp>
+        <p:nvSpPr>
+          <p:cNvPr id="2" name="Title 1"/>
+          <p:cNvSpPr>
+            <a:spLocks noGrp="1"/>
+          </p:cNvSpPr>
+          <p:nvPr>
+            <p:ph type="title"/>
+          </p:nvPr>
+        </p:nvSpPr>
+        <p:spPr/>
+        <p:txBody>
+          <a:bodyPr/>
+          <a:lstStyle/>
+          <a:p>
+            <a:r>
+              <a:rPr lang="en-US" dirty="0">
+                <a:latin typeface="Frutiger 55 Roman" panose="020B0800000000000000" pitchFamily="34" charset="0"/>
+              </a:rPr>
               <a:t>Handling NAs</a:t>
             </a:r>
           </a:p>
@@ -6568,7 +6739,7 @@
 </p:sld>
 </file>
 
-<file path=ppt/slides/slide12.xml><?xml version="1.0" encoding="utf-8"?>
+<file path=ppt/slides/slide13.xml><?xml version="1.0" encoding="utf-8"?>
 <p:sld xmlns:a="http://schemas.openxmlformats.org/drawingml/2006/main" xmlns:r="http://schemas.openxmlformats.org/officeDocument/2006/relationships" xmlns:p="http://schemas.openxmlformats.org/presentationml/2006/main">
   <p:cSld>
     <p:spTree>
@@ -6712,386 +6883,6 @@
 </p:sld>
 </file>
 
-<file path=ppt/slides/slide13.xml><?xml version="1.0" encoding="utf-8"?>
-<p:sld xmlns:a="http://schemas.openxmlformats.org/drawingml/2006/main" xmlns:r="http://schemas.openxmlformats.org/officeDocument/2006/relationships" xmlns:p="http://schemas.openxmlformats.org/presentationml/2006/main">
-  <p:cSld>
-    <p:spTree>
-      <p:nvGrpSpPr>
-        <p:cNvPr id="1" name=""/>
-        <p:cNvGrpSpPr/>
-        <p:nvPr/>
-      </p:nvGrpSpPr>
-      <p:grpSpPr>
-        <a:xfrm>
-          <a:off x="0" y="0"/>
-          <a:ext cx="0" cy="0"/>
-          <a:chOff x="0" y="0"/>
-          <a:chExt cx="0" cy="0"/>
-        </a:xfrm>
-      </p:grpSpPr>
-      <p:sp>
-        <p:nvSpPr>
-          <p:cNvPr id="3" name="Title 2"/>
-          <p:cNvSpPr>
-            <a:spLocks noGrp="1"/>
-          </p:cNvSpPr>
-          <p:nvPr>
-            <p:ph type="title"/>
-          </p:nvPr>
-        </p:nvSpPr>
-        <p:spPr/>
-        <p:txBody>
-          <a:bodyPr/>
-          <a:lstStyle/>
-          <a:p>
-            <a:r>
-              <a:rPr lang="en-US" dirty="0">
-                <a:latin typeface="Frutiger 55 Roman" panose="020B0800000000000000" pitchFamily="34" charset="0"/>
-              </a:rPr>
-              <a:t>Model Selection</a:t>
-            </a:r>
-          </a:p>
-        </p:txBody>
-      </p:sp>
-      <p:sp>
-        <p:nvSpPr>
-          <p:cNvPr id="4" name="Text Placeholder 3"/>
-          <p:cNvSpPr>
-            <a:spLocks noGrp="1"/>
-          </p:cNvSpPr>
-          <p:nvPr>
-            <p:ph type="body" sz="half" idx="2"/>
-          </p:nvPr>
-        </p:nvSpPr>
-        <p:spPr/>
-        <p:txBody>
-          <a:bodyPr/>
-          <a:lstStyle/>
-          <a:p>
-            <a:r>
-              <a:rPr lang="en-US" dirty="0">
-                <a:latin typeface="Frutiger 55 Roman" panose="020B0800000000000000" pitchFamily="34" charset="0"/>
-              </a:rPr>
-              <a:t>Models selected for their ability to handle small data sets and to scale with the data</a:t>
-            </a:r>
-          </a:p>
-        </p:txBody>
-      </p:sp>
-      <p:sp>
-        <p:nvSpPr>
-          <p:cNvPr id="5" name="TextBox 4">
-            <a:extLst>
-              <a:ext uri="{FF2B5EF4-FFF2-40B4-BE49-F238E27FC236}">
-                <a16:creationId xmlns:a16="http://schemas.microsoft.com/office/drawing/2014/main" id="{9CEDA54B-405B-4989-9A20-7EDF63613F31}"/>
-              </a:ext>
-            </a:extLst>
-          </p:cNvPr>
-          <p:cNvSpPr txBox="1"/>
-          <p:nvPr/>
-        </p:nvSpPr>
-        <p:spPr>
-          <a:xfrm>
-            <a:off x="6079448" y="594715"/>
-            <a:ext cx="5487572" cy="6463308"/>
-          </a:xfrm>
-          <a:prstGeom prst="rect">
-            <a:avLst/>
-          </a:prstGeom>
-          <a:noFill/>
-        </p:spPr>
-        <p:txBody>
-          <a:bodyPr wrap="square" rtlCol="0">
-            <a:spAutoFit/>
-          </a:bodyPr>
-          <a:lstStyle/>
-          <a:p>
-            <a:pPr marL="285750" indent="-285750">
-              <a:buFont typeface="Arial" panose="020B0604020202020204" pitchFamily="34" charset="0"/>
-              <a:buChar char="•"/>
-            </a:pPr>
-            <a:r>
-              <a:rPr lang="en-GB" dirty="0" err="1">
-                <a:latin typeface="Frutiger 55 Roman" panose="020B0800000000000000" pitchFamily="34" charset="0"/>
-              </a:rPr>
-              <a:t>SGDClassifier</a:t>
-            </a:r>
-            <a:r>
-              <a:rPr lang="en-GB" dirty="0">
-                <a:latin typeface="Frutiger 55 Roman" panose="020B0800000000000000" pitchFamily="34" charset="0"/>
-              </a:rPr>
-              <a:t>()</a:t>
-            </a:r>
-          </a:p>
-          <a:p>
-            <a:pPr marL="742950" lvl="1" indent="-285750">
-              <a:buFont typeface="Arial" panose="020B0604020202020204" pitchFamily="34" charset="0"/>
-              <a:buChar char="•"/>
-            </a:pPr>
-            <a:r>
-              <a:rPr lang="en-GB" dirty="0">
-                <a:latin typeface="Frutiger 55 Roman" panose="020B0800000000000000" pitchFamily="34" charset="0"/>
-              </a:rPr>
-              <a:t>Dense or Sparse arrays for features</a:t>
-            </a:r>
-          </a:p>
-          <a:p>
-            <a:pPr marL="742950" lvl="1" indent="-285750">
-              <a:buFont typeface="Arial" panose="020B0604020202020204" pitchFamily="34" charset="0"/>
-              <a:buChar char="•"/>
-            </a:pPr>
-            <a:r>
-              <a:rPr lang="en-GB" dirty="0">
-                <a:latin typeface="Frutiger 55 Roman" panose="020B0800000000000000" pitchFamily="34" charset="0"/>
-              </a:rPr>
-              <a:t>Easily scales with data</a:t>
-            </a:r>
-          </a:p>
-          <a:p>
-            <a:pPr marL="742950" lvl="1" indent="-285750">
-              <a:buFont typeface="Arial" panose="020B0604020202020204" pitchFamily="34" charset="0"/>
-              <a:buChar char="•"/>
-            </a:pPr>
-            <a:r>
-              <a:rPr lang="en-GB" dirty="0">
-                <a:latin typeface="Frutiger 55 Roman" panose="020B0800000000000000" pitchFamily="34" charset="0"/>
-              </a:rPr>
-              <a:t>Efficiency</a:t>
-            </a:r>
-          </a:p>
-          <a:p>
-            <a:pPr marL="742950" lvl="1" indent="-285750">
-              <a:buFont typeface="Arial" panose="020B0604020202020204" pitchFamily="34" charset="0"/>
-              <a:buChar char="•"/>
-            </a:pPr>
-            <a:r>
-              <a:rPr lang="en-GB" dirty="0">
-                <a:latin typeface="Frutiger 55 Roman" panose="020B0800000000000000" pitchFamily="34" charset="0"/>
-              </a:rPr>
-              <a:t>Ease of implementation</a:t>
-            </a:r>
-          </a:p>
-          <a:p>
-            <a:pPr marL="1200150" lvl="2" indent="-285750">
-              <a:buFont typeface="Arial" panose="020B0604020202020204" pitchFamily="34" charset="0"/>
-              <a:buChar char="•"/>
-            </a:pPr>
-            <a:r>
-              <a:rPr lang="en-GB" dirty="0">
-                <a:latin typeface="Frutiger 55 Roman" panose="020B0800000000000000" pitchFamily="34" charset="0"/>
-              </a:rPr>
-              <a:t>Sensitive to feature scaling</a:t>
-            </a:r>
-          </a:p>
-          <a:p>
-            <a:pPr marL="1200150" lvl="2" indent="-285750">
-              <a:buFont typeface="Arial" panose="020B0604020202020204" pitchFamily="34" charset="0"/>
-              <a:buChar char="•"/>
-            </a:pPr>
-            <a:r>
-              <a:rPr lang="en-GB" dirty="0">
-                <a:latin typeface="Frutiger 55 Roman" panose="020B0800000000000000" pitchFamily="34" charset="0"/>
-              </a:rPr>
-              <a:t>Requires a number of hyperparameters</a:t>
-            </a:r>
-          </a:p>
-          <a:p>
-            <a:pPr marL="742950" lvl="1" indent="-285750">
-              <a:buFont typeface="Arial" panose="020B0604020202020204" pitchFamily="34" charset="0"/>
-              <a:buChar char="•"/>
-            </a:pPr>
-            <a:endParaRPr lang="en-GB" dirty="0">
-              <a:latin typeface="Frutiger 55 Roman" panose="020B0800000000000000" pitchFamily="34" charset="0"/>
-            </a:endParaRPr>
-          </a:p>
-          <a:p>
-            <a:pPr marL="285750" indent="-285750">
-              <a:buFont typeface="Arial" panose="020B0604020202020204" pitchFamily="34" charset="0"/>
-              <a:buChar char="•"/>
-            </a:pPr>
-            <a:r>
-              <a:rPr lang="en-GB" dirty="0" err="1">
-                <a:latin typeface="Frutiger 55 Roman" panose="020B0800000000000000" pitchFamily="34" charset="0"/>
-              </a:rPr>
-              <a:t>AdaBoostClassifier</a:t>
-            </a:r>
-            <a:r>
-              <a:rPr lang="en-GB" dirty="0">
-                <a:latin typeface="Frutiger 55 Roman" panose="020B0800000000000000" pitchFamily="34" charset="0"/>
-              </a:rPr>
-              <a:t>()</a:t>
-            </a:r>
-          </a:p>
-          <a:p>
-            <a:pPr marL="742950" lvl="1" indent="-285750">
-              <a:buFont typeface="Arial" panose="020B0604020202020204" pitchFamily="34" charset="0"/>
-              <a:buChar char="•"/>
-            </a:pPr>
-            <a:r>
-              <a:rPr lang="en-GB" dirty="0">
-                <a:latin typeface="Frutiger 55 Roman" panose="020B0800000000000000" pitchFamily="34" charset="0"/>
-              </a:rPr>
-              <a:t>Fast</a:t>
-            </a:r>
-          </a:p>
-          <a:p>
-            <a:pPr marL="742950" lvl="1" indent="-285750">
-              <a:buFont typeface="Arial" panose="020B0604020202020204" pitchFamily="34" charset="0"/>
-              <a:buChar char="•"/>
-            </a:pPr>
-            <a:r>
-              <a:rPr lang="en-GB" dirty="0">
-                <a:latin typeface="Frutiger 55 Roman" panose="020B0800000000000000" pitchFamily="34" charset="0"/>
-              </a:rPr>
-              <a:t>Easy</a:t>
-            </a:r>
-          </a:p>
-          <a:p>
-            <a:pPr marL="742950" lvl="1" indent="-285750">
-              <a:buFont typeface="Arial" panose="020B0604020202020204" pitchFamily="34" charset="0"/>
-              <a:buChar char="•"/>
-            </a:pPr>
-            <a:r>
-              <a:rPr lang="en-GB" dirty="0" err="1">
-                <a:latin typeface="Frutiger 55 Roman" panose="020B0800000000000000" pitchFamily="34" charset="0"/>
-              </a:rPr>
-              <a:t>Versitile</a:t>
-            </a:r>
-            <a:endParaRPr lang="en-GB" dirty="0">
-              <a:latin typeface="Frutiger 55 Roman" panose="020B0800000000000000" pitchFamily="34" charset="0"/>
-            </a:endParaRPr>
-          </a:p>
-          <a:p>
-            <a:pPr marL="1200150" lvl="2" indent="-285750">
-              <a:buFont typeface="Arial" panose="020B0604020202020204" pitchFamily="34" charset="0"/>
-              <a:buChar char="•"/>
-            </a:pPr>
-            <a:r>
-              <a:rPr lang="en-GB" dirty="0">
-                <a:latin typeface="Frutiger 55 Roman" panose="020B0800000000000000" pitchFamily="34" charset="0"/>
-              </a:rPr>
-              <a:t>Noisy data poses a problem</a:t>
-            </a:r>
-          </a:p>
-          <a:p>
-            <a:pPr marL="1200150" lvl="2" indent="-285750">
-              <a:buFont typeface="Arial" panose="020B0604020202020204" pitchFamily="34" charset="0"/>
-              <a:buChar char="•"/>
-            </a:pPr>
-            <a:r>
-              <a:rPr lang="en-GB" dirty="0">
-                <a:latin typeface="Frutiger 55 Roman" panose="020B0800000000000000" pitchFamily="34" charset="0"/>
-              </a:rPr>
-              <a:t>Sensitive to outliers</a:t>
-            </a:r>
-          </a:p>
-          <a:p>
-            <a:endParaRPr lang="en-GB" dirty="0">
-              <a:latin typeface="Frutiger 55 Roman" panose="020B0800000000000000" pitchFamily="34" charset="0"/>
-            </a:endParaRPr>
-          </a:p>
-          <a:p>
-            <a:pPr marL="285750" indent="-285750">
-              <a:buFont typeface="Arial" panose="020B0604020202020204" pitchFamily="34" charset="0"/>
-              <a:buChar char="•"/>
-            </a:pPr>
-            <a:r>
-              <a:rPr lang="en-GB" dirty="0" err="1">
-                <a:latin typeface="Frutiger 55 Roman" panose="020B0800000000000000" pitchFamily="34" charset="0"/>
-              </a:rPr>
-              <a:t>GaussianNB</a:t>
-            </a:r>
-            <a:r>
-              <a:rPr lang="en-GB" dirty="0">
-                <a:latin typeface="Frutiger 55 Roman" panose="020B0800000000000000" pitchFamily="34" charset="0"/>
-              </a:rPr>
-              <a:t>()</a:t>
-            </a:r>
-          </a:p>
-          <a:p>
-            <a:pPr marL="742950" lvl="1" indent="-285750">
-              <a:buFont typeface="Arial" panose="020B0604020202020204" pitchFamily="34" charset="0"/>
-              <a:buChar char="•"/>
-            </a:pPr>
-            <a:r>
-              <a:rPr lang="en-GB" dirty="0">
-                <a:latin typeface="Frutiger 55 Roman" panose="020B0800000000000000" pitchFamily="34" charset="0"/>
-              </a:rPr>
-              <a:t>Simple</a:t>
-            </a:r>
-          </a:p>
-          <a:p>
-            <a:pPr marL="742950" lvl="1" indent="-285750">
-              <a:buFont typeface="Arial" panose="020B0604020202020204" pitchFamily="34" charset="0"/>
-              <a:buChar char="•"/>
-            </a:pPr>
-            <a:r>
-              <a:rPr lang="en-GB" dirty="0">
-                <a:latin typeface="Frutiger 55 Roman" panose="020B0800000000000000" pitchFamily="34" charset="0"/>
-              </a:rPr>
-              <a:t>Reliable</a:t>
-            </a:r>
-          </a:p>
-          <a:p>
-            <a:pPr marL="742950" lvl="1" indent="-285750">
-              <a:buFont typeface="Arial" panose="020B0604020202020204" pitchFamily="34" charset="0"/>
-              <a:buChar char="•"/>
-            </a:pPr>
-            <a:r>
-              <a:rPr lang="en-GB" dirty="0">
-                <a:latin typeface="Frutiger 55 Roman" panose="020B0800000000000000" pitchFamily="34" charset="0"/>
-              </a:rPr>
-              <a:t>Needs less training data</a:t>
-            </a:r>
-          </a:p>
-          <a:p>
-            <a:pPr lvl="1"/>
-            <a:endParaRPr lang="en-GB" dirty="0">
-              <a:latin typeface="Frutiger 55 Roman" panose="020B0800000000000000" pitchFamily="34" charset="0"/>
-            </a:endParaRPr>
-          </a:p>
-          <a:p>
-            <a:pPr marL="742950" lvl="1" indent="-285750">
-              <a:buFont typeface="Arial" panose="020B0604020202020204" pitchFamily="34" charset="0"/>
-              <a:buChar char="•"/>
-            </a:pPr>
-            <a:endParaRPr lang="en-GB" dirty="0">
-              <a:latin typeface="Frutiger 55 Roman" panose="020B0800000000000000" pitchFamily="34" charset="0"/>
-            </a:endParaRPr>
-          </a:p>
-          <a:p>
-            <a:pPr marL="742950" lvl="1" indent="-285750">
-              <a:buFont typeface="Arial" panose="020B0604020202020204" pitchFamily="34" charset="0"/>
-              <a:buChar char="•"/>
-            </a:pPr>
-            <a:endParaRPr lang="en-GB" dirty="0"/>
-          </a:p>
-        </p:txBody>
-      </p:sp>
-    </p:spTree>
-    <p:extLst>
-      <p:ext uri="{BB962C8B-B14F-4D97-AF65-F5344CB8AC3E}">
-        <p14:creationId xmlns:p14="http://schemas.microsoft.com/office/powerpoint/2010/main" val="3760552436"/>
-      </p:ext>
-    </p:extLst>
-  </p:cSld>
-  <p:clrMapOvr>
-    <a:masterClrMapping/>
-  </p:clrMapOvr>
-  <mc:AlternateContent xmlns:mc="http://schemas.openxmlformats.org/markup-compatibility/2006" xmlns:p14="http://schemas.microsoft.com/office/powerpoint/2010/main">
-    <mc:Choice Requires="p14">
-      <p:transition spd="med" p14:dur="700">
-        <p:fade/>
-      </p:transition>
-    </mc:Choice>
-    <mc:Fallback xmlns="">
-      <p:transition spd="med">
-        <p:fade/>
-      </p:transition>
-    </mc:Fallback>
-  </mc:AlternateContent>
-</p:sld>
-</file>
-
 <file path=ppt/slides/slide14.xml><?xml version="1.0" encoding="utf-8"?>
 <p:sld xmlns:a="http://schemas.openxmlformats.org/drawingml/2006/main" xmlns:r="http://schemas.openxmlformats.org/officeDocument/2006/relationships" xmlns:p="http://schemas.openxmlformats.org/presentationml/2006/main">
   <p:cSld>
@@ -7111,272 +6902,338 @@
       </p:grpSpPr>
       <p:sp>
         <p:nvSpPr>
-          <p:cNvPr id="2" name="Title 1">
+          <p:cNvPr id="3" name="Title 2"/>
+          <p:cNvSpPr>
+            <a:spLocks noGrp="1"/>
+          </p:cNvSpPr>
+          <p:nvPr>
+            <p:ph type="title"/>
+          </p:nvPr>
+        </p:nvSpPr>
+        <p:spPr/>
+        <p:txBody>
+          <a:bodyPr/>
+          <a:lstStyle/>
+          <a:p>
+            <a:r>
+              <a:rPr lang="en-US" dirty="0">
+                <a:latin typeface="Frutiger 55 Roman" panose="020B0800000000000000" pitchFamily="34" charset="0"/>
+              </a:rPr>
+              <a:t>Model Selection</a:t>
+            </a:r>
+          </a:p>
+        </p:txBody>
+      </p:sp>
+      <p:sp>
+        <p:nvSpPr>
+          <p:cNvPr id="4" name="Text Placeholder 3"/>
+          <p:cNvSpPr>
+            <a:spLocks noGrp="1"/>
+          </p:cNvSpPr>
+          <p:nvPr>
+            <p:ph type="body" sz="half" idx="2"/>
+          </p:nvPr>
+        </p:nvSpPr>
+        <p:spPr/>
+        <p:txBody>
+          <a:bodyPr/>
+          <a:lstStyle/>
+          <a:p>
+            <a:r>
+              <a:rPr lang="en-US" dirty="0">
+                <a:latin typeface="Frutiger 55 Roman" panose="020B0800000000000000" pitchFamily="34" charset="0"/>
+              </a:rPr>
+              <a:t>Models selected for their ability to handle small data sets and to scale with the data</a:t>
+            </a:r>
+          </a:p>
+        </p:txBody>
+      </p:sp>
+      <p:sp>
+        <p:nvSpPr>
+          <p:cNvPr id="5" name="TextBox 4">
             <a:extLst>
               <a:ext uri="{FF2B5EF4-FFF2-40B4-BE49-F238E27FC236}">
-                <a16:creationId xmlns:a16="http://schemas.microsoft.com/office/drawing/2014/main" id="{DEDCD130-74CF-4E33-BC84-29AB49BE7A4F}"/>
+                <a16:creationId xmlns:a16="http://schemas.microsoft.com/office/drawing/2014/main" id="{9CEDA54B-405B-4989-9A20-7EDF63613F31}"/>
               </a:ext>
             </a:extLst>
           </p:cNvPr>
-          <p:cNvSpPr>
-            <a:spLocks noGrp="1"/>
-          </p:cNvSpPr>
-          <p:nvPr>
-            <p:ph type="title"/>
-          </p:nvPr>
+          <p:cNvSpPr txBox="1"/>
+          <p:nvPr/>
         </p:nvSpPr>
         <p:spPr>
           <a:xfrm>
-            <a:off x="1978023" y="260648"/>
-            <a:ext cx="9144001" cy="1219200"/>
+            <a:off x="6079448" y="594715"/>
+            <a:ext cx="5487572" cy="6463308"/>
           </a:xfrm>
+          <a:prstGeom prst="rect">
+            <a:avLst/>
+          </a:prstGeom>
+          <a:noFill/>
         </p:spPr>
         <p:txBody>
-          <a:bodyPr/>
-          <a:lstStyle/>
-          <a:p>
-            <a:pPr algn="ctr"/>
+          <a:bodyPr wrap="square" rtlCol="0">
+            <a:spAutoFit/>
+          </a:bodyPr>
+          <a:lstStyle/>
+          <a:p>
+            <a:pPr marL="285750" indent="-285750">
+              <a:buFont typeface="Arial" panose="020B0604020202020204" pitchFamily="34" charset="0"/>
+              <a:buChar char="•"/>
+            </a:pPr>
+            <a:r>
+              <a:rPr lang="en-GB" dirty="0" err="1">
+                <a:latin typeface="Frutiger 55 Roman" panose="020B0800000000000000" pitchFamily="34" charset="0"/>
+              </a:rPr>
+              <a:t>SGDClassifier</a:t>
+            </a:r>
             <a:r>
               <a:rPr lang="en-GB" dirty="0">
                 <a:latin typeface="Frutiger 55 Roman" panose="020B0800000000000000" pitchFamily="34" charset="0"/>
               </a:rPr>
-              <a:t>Results</a:t>
-            </a:r>
-          </a:p>
-        </p:txBody>
-      </p:sp>
-      <p:sp>
-        <p:nvSpPr>
-          <p:cNvPr id="3" name="Text Placeholder 2">
-            <a:extLst>
-              <a:ext uri="{FF2B5EF4-FFF2-40B4-BE49-F238E27FC236}">
-                <a16:creationId xmlns:a16="http://schemas.microsoft.com/office/drawing/2014/main" id="{2F596682-9D5F-49A5-BB71-CF638C1CAD1D}"/>
-              </a:ext>
-            </a:extLst>
-          </p:cNvPr>
-          <p:cNvSpPr>
-            <a:spLocks noGrp="1"/>
-          </p:cNvSpPr>
-          <p:nvPr>
-            <p:ph type="body" idx="1"/>
-          </p:nvPr>
-        </p:nvSpPr>
-        <p:spPr>
-          <a:xfrm>
-            <a:off x="1978022" y="1828800"/>
-            <a:ext cx="2460206" cy="838200"/>
-          </a:xfrm>
-        </p:spPr>
-        <p:txBody>
-          <a:bodyPr/>
-          <a:lstStyle/>
-          <a:p>
+              <a:t>()</a:t>
+            </a:r>
+          </a:p>
+          <a:p>
+            <a:pPr marL="742950" lvl="1" indent="-285750">
+              <a:buFont typeface="Arial" panose="020B0604020202020204" pitchFamily="34" charset="0"/>
+              <a:buChar char="•"/>
+            </a:pPr>
             <a:r>
               <a:rPr lang="en-GB" dirty="0">
                 <a:latin typeface="Frutiger 55 Roman" panose="020B0800000000000000" pitchFamily="34" charset="0"/>
               </a:rPr>
-              <a:t>Data</a:t>
-            </a:r>
-          </a:p>
-        </p:txBody>
-      </p:sp>
-      <p:sp>
-        <p:nvSpPr>
-          <p:cNvPr id="4" name="Content Placeholder 3">
-            <a:extLst>
-              <a:ext uri="{FF2B5EF4-FFF2-40B4-BE49-F238E27FC236}">
-                <a16:creationId xmlns:a16="http://schemas.microsoft.com/office/drawing/2014/main" id="{8EBFBEB2-3226-4EC1-9FE6-D284345FDC25}"/>
-              </a:ext>
-            </a:extLst>
-          </p:cNvPr>
-          <p:cNvSpPr>
-            <a:spLocks noGrp="1"/>
-          </p:cNvSpPr>
-          <p:nvPr>
-            <p:ph sz="half" idx="2"/>
-          </p:nvPr>
-        </p:nvSpPr>
-        <p:spPr>
-          <a:xfrm>
-            <a:off x="1978022" y="2743200"/>
-            <a:ext cx="2460206" cy="3505200"/>
-          </a:xfrm>
-        </p:spPr>
-        <p:txBody>
-          <a:bodyPr>
-            <a:normAutofit lnSpcReduction="10000"/>
-          </a:bodyPr>
-          <a:lstStyle/>
-          <a:p>
-            <a:r>
-              <a:rPr lang="en-GB" dirty="0" err="1">
-                <a:latin typeface="Frutiger 55 Roman" panose="020B0800000000000000" pitchFamily="34" charset="0"/>
-              </a:rPr>
-              <a:t>newData</a:t>
-            </a:r>
+              <a:t>Dense or Sparse arrays for features</a:t>
+            </a:r>
+          </a:p>
+          <a:p>
+            <a:pPr marL="742950" lvl="1" indent="-285750">
+              <a:buFont typeface="Arial" panose="020B0604020202020204" pitchFamily="34" charset="0"/>
+              <a:buChar char="•"/>
+            </a:pPr>
             <a:r>
               <a:rPr lang="en-GB" dirty="0">
                 <a:latin typeface="Frutiger 55 Roman" panose="020B0800000000000000" pitchFamily="34" charset="0"/>
               </a:rPr>
-              <a:t> (synthetic)</a:t>
-            </a:r>
-          </a:p>
-          <a:p>
+              <a:t>Easily scales with data</a:t>
+            </a:r>
+          </a:p>
+          <a:p>
+            <a:pPr marL="742950" lvl="1" indent="-285750">
+              <a:buFont typeface="Arial" panose="020B0604020202020204" pitchFamily="34" charset="0"/>
+              <a:buChar char="•"/>
+            </a:pPr>
+            <a:r>
+              <a:rPr lang="en-GB" dirty="0">
+                <a:latin typeface="Frutiger 55 Roman" panose="020B0800000000000000" pitchFamily="34" charset="0"/>
+              </a:rPr>
+              <a:t>Efficiency</a:t>
+            </a:r>
+          </a:p>
+          <a:p>
+            <a:pPr marL="742950" lvl="1" indent="-285750">
+              <a:buFont typeface="Arial" panose="020B0604020202020204" pitchFamily="34" charset="0"/>
+              <a:buChar char="•"/>
+            </a:pPr>
+            <a:r>
+              <a:rPr lang="en-GB" dirty="0">
+                <a:latin typeface="Frutiger 55 Roman" panose="020B0800000000000000" pitchFamily="34" charset="0"/>
+              </a:rPr>
+              <a:t>Ease of implementation</a:t>
+            </a:r>
+          </a:p>
+          <a:p>
+            <a:pPr marL="1200150" lvl="2" indent="-285750">
+              <a:buFont typeface="Arial" panose="020B0604020202020204" pitchFamily="34" charset="0"/>
+              <a:buChar char="•"/>
+            </a:pPr>
+            <a:r>
+              <a:rPr lang="en-GB" dirty="0">
+                <a:latin typeface="Frutiger 55 Roman" panose="020B0800000000000000" pitchFamily="34" charset="0"/>
+              </a:rPr>
+              <a:t>Sensitive to feature scaling</a:t>
+            </a:r>
+          </a:p>
+          <a:p>
+            <a:pPr marL="1200150" lvl="2" indent="-285750">
+              <a:buFont typeface="Arial" panose="020B0604020202020204" pitchFamily="34" charset="0"/>
+              <a:buChar char="•"/>
+            </a:pPr>
+            <a:r>
+              <a:rPr lang="en-GB" dirty="0">
+                <a:latin typeface="Frutiger 55 Roman" panose="020B0800000000000000" pitchFamily="34" charset="0"/>
+              </a:rPr>
+              <a:t>Requires a number of hyperparameters</a:t>
+            </a:r>
+          </a:p>
+          <a:p>
+            <a:pPr marL="742950" lvl="1" indent="-285750">
+              <a:buFont typeface="Arial" panose="020B0604020202020204" pitchFamily="34" charset="0"/>
+              <a:buChar char="•"/>
+            </a:pPr>
             <a:endParaRPr lang="en-GB" dirty="0">
               <a:latin typeface="Frutiger 55 Roman" panose="020B0800000000000000" pitchFamily="34" charset="0"/>
             </a:endParaRPr>
           </a:p>
           <a:p>
+            <a:pPr marL="285750" indent="-285750">
+              <a:buFont typeface="Arial" panose="020B0604020202020204" pitchFamily="34" charset="0"/>
+              <a:buChar char="•"/>
+            </a:pPr>
+            <a:r>
+              <a:rPr lang="en-GB" dirty="0" err="1">
+                <a:latin typeface="Frutiger 55 Roman" panose="020B0800000000000000" pitchFamily="34" charset="0"/>
+              </a:rPr>
+              <a:t>AdaBoostClassifier</a:t>
+            </a:r>
             <a:r>
               <a:rPr lang="en-GB" dirty="0">
                 <a:latin typeface="Frutiger 55 Roman" panose="020B0800000000000000" pitchFamily="34" charset="0"/>
               </a:rPr>
-              <a:t>Sparse</a:t>
-            </a:r>
-          </a:p>
-          <a:p>
+              <a:t>()</a:t>
+            </a:r>
+          </a:p>
+          <a:p>
+            <a:pPr marL="742950" lvl="1" indent="-285750">
+              <a:buFont typeface="Arial" panose="020B0604020202020204" pitchFamily="34" charset="0"/>
+              <a:buChar char="•"/>
+            </a:pPr>
+            <a:r>
+              <a:rPr lang="en-GB" dirty="0">
+                <a:latin typeface="Frutiger 55 Roman" panose="020B0800000000000000" pitchFamily="34" charset="0"/>
+              </a:rPr>
+              <a:t>Fast</a:t>
+            </a:r>
+          </a:p>
+          <a:p>
+            <a:pPr marL="742950" lvl="1" indent="-285750">
+              <a:buFont typeface="Arial" panose="020B0604020202020204" pitchFamily="34" charset="0"/>
+              <a:buChar char="•"/>
+            </a:pPr>
+            <a:r>
+              <a:rPr lang="en-GB" dirty="0">
+                <a:latin typeface="Frutiger 55 Roman" panose="020B0800000000000000" pitchFamily="34" charset="0"/>
+              </a:rPr>
+              <a:t>Easy</a:t>
+            </a:r>
+          </a:p>
+          <a:p>
+            <a:pPr marL="742950" lvl="1" indent="-285750">
+              <a:buFont typeface="Arial" panose="020B0604020202020204" pitchFamily="34" charset="0"/>
+              <a:buChar char="•"/>
+            </a:pPr>
+            <a:r>
+              <a:rPr lang="en-GB" dirty="0" err="1">
+                <a:latin typeface="Frutiger 55 Roman" panose="020B0800000000000000" pitchFamily="34" charset="0"/>
+              </a:rPr>
+              <a:t>Versitile</a:t>
+            </a:r>
             <a:endParaRPr lang="en-GB" dirty="0">
               <a:latin typeface="Frutiger 55 Roman" panose="020B0800000000000000" pitchFamily="34" charset="0"/>
             </a:endParaRPr>
           </a:p>
           <a:p>
-            <a:r>
-              <a:rPr lang="en-GB" dirty="0" err="1">
-                <a:latin typeface="Frutiger 55 Roman" panose="020B0800000000000000" pitchFamily="34" charset="0"/>
-              </a:rPr>
-              <a:t>Feats_zeroes</a:t>
-            </a:r>
+            <a:pPr marL="1200150" lvl="2" indent="-285750">
+              <a:buFont typeface="Arial" panose="020B0604020202020204" pitchFamily="34" charset="0"/>
+              <a:buChar char="•"/>
+            </a:pPr>
+            <a:r>
+              <a:rPr lang="en-GB" dirty="0">
+                <a:latin typeface="Frutiger 55 Roman" panose="020B0800000000000000" pitchFamily="34" charset="0"/>
+              </a:rPr>
+              <a:t>Noisy data poses a problem</a:t>
+            </a:r>
+          </a:p>
+          <a:p>
+            <a:pPr marL="1200150" lvl="2" indent="-285750">
+              <a:buFont typeface="Arial" panose="020B0604020202020204" pitchFamily="34" charset="0"/>
+              <a:buChar char="•"/>
+            </a:pPr>
+            <a:r>
+              <a:rPr lang="en-GB" dirty="0">
+                <a:latin typeface="Frutiger 55 Roman" panose="020B0800000000000000" pitchFamily="34" charset="0"/>
+              </a:rPr>
+              <a:t>Sensitive to outliers</a:t>
+            </a:r>
+          </a:p>
+          <a:p>
             <a:endParaRPr lang="en-GB" dirty="0">
               <a:latin typeface="Frutiger 55 Roman" panose="020B0800000000000000" pitchFamily="34" charset="0"/>
             </a:endParaRPr>
           </a:p>
           <a:p>
+            <a:pPr marL="285750" indent="-285750">
+              <a:buFont typeface="Arial" panose="020B0604020202020204" pitchFamily="34" charset="0"/>
+              <a:buChar char="•"/>
+            </a:pPr>
+            <a:r>
+              <a:rPr lang="en-GB" dirty="0" err="1">
+                <a:latin typeface="Frutiger 55 Roman" panose="020B0800000000000000" pitchFamily="34" charset="0"/>
+              </a:rPr>
+              <a:t>GaussianNB</a:t>
+            </a:r>
+            <a:r>
+              <a:rPr lang="en-GB" dirty="0">
+                <a:latin typeface="Frutiger 55 Roman" panose="020B0800000000000000" pitchFamily="34" charset="0"/>
+              </a:rPr>
+              <a:t>()</a:t>
+            </a:r>
+          </a:p>
+          <a:p>
+            <a:pPr marL="742950" lvl="1" indent="-285750">
+              <a:buFont typeface="Arial" panose="020B0604020202020204" pitchFamily="34" charset="0"/>
+              <a:buChar char="•"/>
+            </a:pPr>
+            <a:r>
+              <a:rPr lang="en-GB" dirty="0">
+                <a:latin typeface="Frutiger 55 Roman" panose="020B0800000000000000" pitchFamily="34" charset="0"/>
+              </a:rPr>
+              <a:t>Simple</a:t>
+            </a:r>
+          </a:p>
+          <a:p>
+            <a:pPr marL="742950" lvl="1" indent="-285750">
+              <a:buFont typeface="Arial" panose="020B0604020202020204" pitchFamily="34" charset="0"/>
+              <a:buChar char="•"/>
+            </a:pPr>
+            <a:r>
+              <a:rPr lang="en-GB" dirty="0">
+                <a:latin typeface="Frutiger 55 Roman" panose="020B0800000000000000" pitchFamily="34" charset="0"/>
+              </a:rPr>
+              <a:t>Reliable</a:t>
+            </a:r>
+          </a:p>
+          <a:p>
+            <a:pPr marL="742950" lvl="1" indent="-285750">
+              <a:buFont typeface="Arial" panose="020B0604020202020204" pitchFamily="34" charset="0"/>
+              <a:buChar char="•"/>
+            </a:pPr>
+            <a:r>
+              <a:rPr lang="en-GB" dirty="0">
+                <a:latin typeface="Frutiger 55 Roman" panose="020B0800000000000000" pitchFamily="34" charset="0"/>
+              </a:rPr>
+              <a:t>Needs less training data</a:t>
+            </a:r>
+          </a:p>
+          <a:p>
+            <a:pPr lvl="1"/>
             <a:endParaRPr lang="en-GB" dirty="0">
               <a:latin typeface="Frutiger 55 Roman" panose="020B0800000000000000" pitchFamily="34" charset="0"/>
             </a:endParaRPr>
           </a:p>
           <a:p>
-            <a:r>
-              <a:rPr lang="en-GB" dirty="0" err="1">
-                <a:latin typeface="Frutiger 55 Roman" panose="020B0800000000000000" pitchFamily="34" charset="0"/>
-              </a:rPr>
-              <a:t>sBest</a:t>
-            </a:r>
+            <a:pPr marL="742950" lvl="1" indent="-285750">
+              <a:buFont typeface="Arial" panose="020B0604020202020204" pitchFamily="34" charset="0"/>
+              <a:buChar char="•"/>
+            </a:pPr>
             <a:endParaRPr lang="en-GB" dirty="0">
               <a:latin typeface="Frutiger 55 Roman" panose="020B0800000000000000" pitchFamily="34" charset="0"/>
             </a:endParaRPr>
           </a:p>
-        </p:txBody>
-      </p:sp>
-      <p:sp>
-        <p:nvSpPr>
-          <p:cNvPr id="5" name="Text Placeholder 4">
-            <a:extLst>
-              <a:ext uri="{FF2B5EF4-FFF2-40B4-BE49-F238E27FC236}">
-                <a16:creationId xmlns:a16="http://schemas.microsoft.com/office/drawing/2014/main" id="{0D53691B-DA8C-42C6-9C34-8287780C6199}"/>
-              </a:ext>
-            </a:extLst>
-          </p:cNvPr>
-          <p:cNvSpPr>
-            <a:spLocks noGrp="1"/>
-          </p:cNvSpPr>
-          <p:nvPr>
-            <p:ph type="body" sz="quarter" idx="3"/>
-          </p:nvPr>
-        </p:nvSpPr>
-        <p:spPr>
-          <a:xfrm>
-            <a:off x="4471304" y="1828800"/>
-            <a:ext cx="6650720" cy="838200"/>
-          </a:xfrm>
-        </p:spPr>
-        <p:txBody>
-          <a:bodyPr/>
-          <a:lstStyle/>
-          <a:p>
-            <a:r>
-              <a:rPr lang="en-GB" dirty="0">
-                <a:latin typeface="Frutiger 55 Roman" panose="020B0800000000000000" pitchFamily="34" charset="0"/>
-              </a:rPr>
-              <a:t>Models</a:t>
-            </a:r>
-          </a:p>
-          <a:p>
-            <a:endParaRPr lang="en-GB" dirty="0">
-              <a:latin typeface="Frutiger 55 Roman" panose="020B0800000000000000" pitchFamily="34" charset="0"/>
-            </a:endParaRPr>
-          </a:p>
-          <a:p>
-            <a:r>
-              <a:rPr lang="en-GB" dirty="0">
-                <a:latin typeface="Frutiger 55 Roman" panose="020B0800000000000000" pitchFamily="34" charset="0"/>
-              </a:rPr>
-              <a:t>  SGD	   		  Ada	      		 GNB</a:t>
-            </a:r>
-          </a:p>
-        </p:txBody>
-      </p:sp>
-      <p:sp>
-        <p:nvSpPr>
-          <p:cNvPr id="6" name="Content Placeholder 5">
-            <a:extLst>
-              <a:ext uri="{FF2B5EF4-FFF2-40B4-BE49-F238E27FC236}">
-                <a16:creationId xmlns:a16="http://schemas.microsoft.com/office/drawing/2014/main" id="{9BC69DD3-902A-4EDB-9BD1-7B601CB827A1}"/>
-              </a:ext>
-            </a:extLst>
-          </p:cNvPr>
-          <p:cNvSpPr>
-            <a:spLocks noGrp="1"/>
-          </p:cNvSpPr>
-          <p:nvPr>
-            <p:ph sz="quarter" idx="4"/>
-          </p:nvPr>
-        </p:nvSpPr>
-        <p:spPr>
-          <a:xfrm>
-            <a:off x="4523184" y="2743200"/>
-            <a:ext cx="6683796" cy="3505200"/>
-          </a:xfrm>
-        </p:spPr>
-        <p:txBody>
-          <a:bodyPr>
-            <a:normAutofit lnSpcReduction="10000"/>
-          </a:bodyPr>
-          <a:lstStyle/>
-          <a:p>
-            <a:r>
-              <a:rPr lang="en-GB" dirty="0"/>
-              <a:t>55%			    96%			  92%</a:t>
-            </a:r>
-          </a:p>
-          <a:p>
-            <a:endParaRPr lang="en-GB" dirty="0"/>
-          </a:p>
-          <a:p>
-            <a:r>
-              <a:rPr lang="en-GB" dirty="0"/>
-              <a:t>77%			    90%			  78%</a:t>
-            </a:r>
-          </a:p>
-          <a:p>
-            <a:endParaRPr lang="en-GB" dirty="0"/>
-          </a:p>
-          <a:p>
-            <a:r>
-              <a:rPr lang="en-GB" dirty="0"/>
-              <a:t>89%			    94%			  85%</a:t>
-            </a:r>
-          </a:p>
-          <a:p>
-            <a:endParaRPr lang="en-GB" dirty="0"/>
-          </a:p>
-          <a:p>
-            <a:r>
-              <a:rPr lang="en-GB" dirty="0"/>
-              <a:t>86%			    86%			  87%</a:t>
-            </a:r>
-          </a:p>
-          <a:p>
+          <a:p>
+            <a:pPr marL="742950" lvl="1" indent="-285750">
+              <a:buFont typeface="Arial" panose="020B0604020202020204" pitchFamily="34" charset="0"/>
+              <a:buChar char="•"/>
+            </a:pPr>
             <a:endParaRPr lang="en-GB" dirty="0"/>
           </a:p>
         </p:txBody>
@@ -7384,7 +7241,7 @@
     </p:spTree>
     <p:extLst>
       <p:ext uri="{BB962C8B-B14F-4D97-AF65-F5344CB8AC3E}">
-        <p14:creationId xmlns:p14="http://schemas.microsoft.com/office/powerpoint/2010/main" val="613379950"/>
+        <p14:creationId xmlns:p14="http://schemas.microsoft.com/office/powerpoint/2010/main" val="3760552436"/>
       </p:ext>
     </p:extLst>
   </p:cSld>
@@ -7428,6 +7285,320 @@
           <p:cNvPr id="2" name="Title 1">
             <a:extLst>
               <a:ext uri="{FF2B5EF4-FFF2-40B4-BE49-F238E27FC236}">
+                <a16:creationId xmlns:a16="http://schemas.microsoft.com/office/drawing/2014/main" id="{DEDCD130-74CF-4E33-BC84-29AB49BE7A4F}"/>
+              </a:ext>
+            </a:extLst>
+          </p:cNvPr>
+          <p:cNvSpPr>
+            <a:spLocks noGrp="1"/>
+          </p:cNvSpPr>
+          <p:nvPr>
+            <p:ph type="title"/>
+          </p:nvPr>
+        </p:nvSpPr>
+        <p:spPr>
+          <a:xfrm>
+            <a:off x="1978023" y="260648"/>
+            <a:ext cx="9144001" cy="1219200"/>
+          </a:xfrm>
+        </p:spPr>
+        <p:txBody>
+          <a:bodyPr/>
+          <a:lstStyle/>
+          <a:p>
+            <a:pPr algn="ctr"/>
+            <a:r>
+              <a:rPr lang="en-GB" dirty="0">
+                <a:latin typeface="Frutiger 55 Roman" panose="020B0800000000000000" pitchFamily="34" charset="0"/>
+              </a:rPr>
+              <a:t>Results</a:t>
+            </a:r>
+          </a:p>
+        </p:txBody>
+      </p:sp>
+      <p:sp>
+        <p:nvSpPr>
+          <p:cNvPr id="3" name="Text Placeholder 2">
+            <a:extLst>
+              <a:ext uri="{FF2B5EF4-FFF2-40B4-BE49-F238E27FC236}">
+                <a16:creationId xmlns:a16="http://schemas.microsoft.com/office/drawing/2014/main" id="{2F596682-9D5F-49A5-BB71-CF638C1CAD1D}"/>
+              </a:ext>
+            </a:extLst>
+          </p:cNvPr>
+          <p:cNvSpPr>
+            <a:spLocks noGrp="1"/>
+          </p:cNvSpPr>
+          <p:nvPr>
+            <p:ph type="body" idx="1"/>
+          </p:nvPr>
+        </p:nvSpPr>
+        <p:spPr>
+          <a:xfrm>
+            <a:off x="1978022" y="1828800"/>
+            <a:ext cx="2460206" cy="838200"/>
+          </a:xfrm>
+        </p:spPr>
+        <p:txBody>
+          <a:bodyPr/>
+          <a:lstStyle/>
+          <a:p>
+            <a:r>
+              <a:rPr lang="en-GB" dirty="0">
+                <a:latin typeface="Frutiger 55 Roman" panose="020B0800000000000000" pitchFamily="34" charset="0"/>
+              </a:rPr>
+              <a:t>Data</a:t>
+            </a:r>
+          </a:p>
+        </p:txBody>
+      </p:sp>
+      <p:sp>
+        <p:nvSpPr>
+          <p:cNvPr id="4" name="Content Placeholder 3">
+            <a:extLst>
+              <a:ext uri="{FF2B5EF4-FFF2-40B4-BE49-F238E27FC236}">
+                <a16:creationId xmlns:a16="http://schemas.microsoft.com/office/drawing/2014/main" id="{8EBFBEB2-3226-4EC1-9FE6-D284345FDC25}"/>
+              </a:ext>
+            </a:extLst>
+          </p:cNvPr>
+          <p:cNvSpPr>
+            <a:spLocks noGrp="1"/>
+          </p:cNvSpPr>
+          <p:nvPr>
+            <p:ph sz="half" idx="2"/>
+          </p:nvPr>
+        </p:nvSpPr>
+        <p:spPr>
+          <a:xfrm>
+            <a:off x="1978022" y="2743200"/>
+            <a:ext cx="2460206" cy="3505200"/>
+          </a:xfrm>
+        </p:spPr>
+        <p:txBody>
+          <a:bodyPr>
+            <a:normAutofit lnSpcReduction="10000"/>
+          </a:bodyPr>
+          <a:lstStyle/>
+          <a:p>
+            <a:r>
+              <a:rPr lang="en-GB" dirty="0" err="1">
+                <a:latin typeface="Frutiger 55 Roman" panose="020B0800000000000000" pitchFamily="34" charset="0"/>
+              </a:rPr>
+              <a:t>newData</a:t>
+            </a:r>
+            <a:r>
+              <a:rPr lang="en-GB" dirty="0">
+                <a:latin typeface="Frutiger 55 Roman" panose="020B0800000000000000" pitchFamily="34" charset="0"/>
+              </a:rPr>
+              <a:t> (synthetic)</a:t>
+            </a:r>
+          </a:p>
+          <a:p>
+            <a:endParaRPr lang="en-GB" dirty="0">
+              <a:latin typeface="Frutiger 55 Roman" panose="020B0800000000000000" pitchFamily="34" charset="0"/>
+            </a:endParaRPr>
+          </a:p>
+          <a:p>
+            <a:r>
+              <a:rPr lang="en-GB" dirty="0">
+                <a:latin typeface="Frutiger 55 Roman" panose="020B0800000000000000" pitchFamily="34" charset="0"/>
+              </a:rPr>
+              <a:t>Sparse</a:t>
+            </a:r>
+          </a:p>
+          <a:p>
+            <a:endParaRPr lang="en-GB" dirty="0">
+              <a:latin typeface="Frutiger 55 Roman" panose="020B0800000000000000" pitchFamily="34" charset="0"/>
+            </a:endParaRPr>
+          </a:p>
+          <a:p>
+            <a:r>
+              <a:rPr lang="en-GB" dirty="0" err="1">
+                <a:latin typeface="Frutiger 55 Roman" panose="020B0800000000000000" pitchFamily="34" charset="0"/>
+              </a:rPr>
+              <a:t>Feats_zeroes</a:t>
+            </a:r>
+            <a:endParaRPr lang="en-GB" dirty="0">
+              <a:latin typeface="Frutiger 55 Roman" panose="020B0800000000000000" pitchFamily="34" charset="0"/>
+            </a:endParaRPr>
+          </a:p>
+          <a:p>
+            <a:endParaRPr lang="en-GB" dirty="0">
+              <a:latin typeface="Frutiger 55 Roman" panose="020B0800000000000000" pitchFamily="34" charset="0"/>
+            </a:endParaRPr>
+          </a:p>
+          <a:p>
+            <a:r>
+              <a:rPr lang="en-GB" dirty="0" err="1">
+                <a:latin typeface="Frutiger 55 Roman" panose="020B0800000000000000" pitchFamily="34" charset="0"/>
+              </a:rPr>
+              <a:t>sBest</a:t>
+            </a:r>
+            <a:endParaRPr lang="en-GB" dirty="0">
+              <a:latin typeface="Frutiger 55 Roman" panose="020B0800000000000000" pitchFamily="34" charset="0"/>
+            </a:endParaRPr>
+          </a:p>
+        </p:txBody>
+      </p:sp>
+      <p:sp>
+        <p:nvSpPr>
+          <p:cNvPr id="5" name="Text Placeholder 4">
+            <a:extLst>
+              <a:ext uri="{FF2B5EF4-FFF2-40B4-BE49-F238E27FC236}">
+                <a16:creationId xmlns:a16="http://schemas.microsoft.com/office/drawing/2014/main" id="{0D53691B-DA8C-42C6-9C34-8287780C6199}"/>
+              </a:ext>
+            </a:extLst>
+          </p:cNvPr>
+          <p:cNvSpPr>
+            <a:spLocks noGrp="1"/>
+          </p:cNvSpPr>
+          <p:nvPr>
+            <p:ph type="body" sz="quarter" idx="3"/>
+          </p:nvPr>
+        </p:nvSpPr>
+        <p:spPr>
+          <a:xfrm>
+            <a:off x="4471304" y="1828800"/>
+            <a:ext cx="6650720" cy="838200"/>
+          </a:xfrm>
+        </p:spPr>
+        <p:txBody>
+          <a:bodyPr/>
+          <a:lstStyle/>
+          <a:p>
+            <a:r>
+              <a:rPr lang="en-GB" dirty="0">
+                <a:latin typeface="Frutiger 55 Roman" panose="020B0800000000000000" pitchFamily="34" charset="0"/>
+              </a:rPr>
+              <a:t>Models</a:t>
+            </a:r>
+          </a:p>
+          <a:p>
+            <a:endParaRPr lang="en-GB" dirty="0">
+              <a:latin typeface="Frutiger 55 Roman" panose="020B0800000000000000" pitchFamily="34" charset="0"/>
+            </a:endParaRPr>
+          </a:p>
+          <a:p>
+            <a:r>
+              <a:rPr lang="en-GB" dirty="0">
+                <a:latin typeface="Frutiger 55 Roman" panose="020B0800000000000000" pitchFamily="34" charset="0"/>
+              </a:rPr>
+              <a:t>  SGD	   		  Ada	      		 GNB</a:t>
+            </a:r>
+          </a:p>
+        </p:txBody>
+      </p:sp>
+      <p:sp>
+        <p:nvSpPr>
+          <p:cNvPr id="6" name="Content Placeholder 5">
+            <a:extLst>
+              <a:ext uri="{FF2B5EF4-FFF2-40B4-BE49-F238E27FC236}">
+                <a16:creationId xmlns:a16="http://schemas.microsoft.com/office/drawing/2014/main" id="{9BC69DD3-902A-4EDB-9BD1-7B601CB827A1}"/>
+              </a:ext>
+            </a:extLst>
+          </p:cNvPr>
+          <p:cNvSpPr>
+            <a:spLocks noGrp="1"/>
+          </p:cNvSpPr>
+          <p:nvPr>
+            <p:ph sz="quarter" idx="4"/>
+          </p:nvPr>
+        </p:nvSpPr>
+        <p:spPr>
+          <a:xfrm>
+            <a:off x="4523184" y="2743200"/>
+            <a:ext cx="6683796" cy="3505200"/>
+          </a:xfrm>
+        </p:spPr>
+        <p:txBody>
+          <a:bodyPr>
+            <a:normAutofit lnSpcReduction="10000"/>
+          </a:bodyPr>
+          <a:lstStyle/>
+          <a:p>
+            <a:r>
+              <a:rPr lang="en-GB" dirty="0"/>
+              <a:t>55%			    96%			  92%</a:t>
+            </a:r>
+          </a:p>
+          <a:p>
+            <a:endParaRPr lang="en-GB" dirty="0"/>
+          </a:p>
+          <a:p>
+            <a:r>
+              <a:rPr lang="en-GB" dirty="0"/>
+              <a:t>77%			    90%			  78%</a:t>
+            </a:r>
+          </a:p>
+          <a:p>
+            <a:endParaRPr lang="en-GB" dirty="0"/>
+          </a:p>
+          <a:p>
+            <a:r>
+              <a:rPr lang="en-GB" dirty="0"/>
+              <a:t>89%			    94%			  85%</a:t>
+            </a:r>
+          </a:p>
+          <a:p>
+            <a:endParaRPr lang="en-GB" dirty="0"/>
+          </a:p>
+          <a:p>
+            <a:r>
+              <a:rPr lang="en-GB" dirty="0"/>
+              <a:t>86%			    86%			  87%</a:t>
+            </a:r>
+          </a:p>
+          <a:p>
+            <a:endParaRPr lang="en-GB" dirty="0"/>
+          </a:p>
+        </p:txBody>
+      </p:sp>
+    </p:spTree>
+    <p:extLst>
+      <p:ext uri="{BB962C8B-B14F-4D97-AF65-F5344CB8AC3E}">
+        <p14:creationId xmlns:p14="http://schemas.microsoft.com/office/powerpoint/2010/main" val="613379950"/>
+      </p:ext>
+    </p:extLst>
+  </p:cSld>
+  <p:clrMapOvr>
+    <a:masterClrMapping/>
+  </p:clrMapOvr>
+  <mc:AlternateContent xmlns:mc="http://schemas.openxmlformats.org/markup-compatibility/2006" xmlns:p14="http://schemas.microsoft.com/office/powerpoint/2010/main">
+    <mc:Choice Requires="p14">
+      <p:transition spd="med" p14:dur="700">
+        <p:fade/>
+      </p:transition>
+    </mc:Choice>
+    <mc:Fallback xmlns="">
+      <p:transition spd="med">
+        <p:fade/>
+      </p:transition>
+    </mc:Fallback>
+  </mc:AlternateContent>
+</p:sld>
+</file>
+
+<file path=ppt/slides/slide16.xml><?xml version="1.0" encoding="utf-8"?>
+<p:sld xmlns:a="http://schemas.openxmlformats.org/drawingml/2006/main" xmlns:r="http://schemas.openxmlformats.org/officeDocument/2006/relationships" xmlns:p="http://schemas.openxmlformats.org/presentationml/2006/main">
+  <p:cSld>
+    <p:spTree>
+      <p:nvGrpSpPr>
+        <p:cNvPr id="1" name=""/>
+        <p:cNvGrpSpPr/>
+        <p:nvPr/>
+      </p:nvGrpSpPr>
+      <p:grpSpPr>
+        <a:xfrm>
+          <a:off x="0" y="0"/>
+          <a:ext cx="0" cy="0"/>
+          <a:chOff x="0" y="0"/>
+          <a:chExt cx="0" cy="0"/>
+        </a:xfrm>
+      </p:grpSpPr>
+      <p:sp>
+        <p:nvSpPr>
+          <p:cNvPr id="2" name="Title 1">
+            <a:extLst>
+              <a:ext uri="{FF2B5EF4-FFF2-40B4-BE49-F238E27FC236}">
                 <a16:creationId xmlns:a16="http://schemas.microsoft.com/office/drawing/2014/main" id="{12731E2F-C187-4E95-9EAB-1DB6E5670AE9}"/>
               </a:ext>
             </a:extLst>
@@ -7687,7 +7858,7 @@
 </p:sld>
 </file>
 
-<file path=ppt/slides/slide16.xml><?xml version="1.0" encoding="utf-8"?>
+<file path=ppt/slides/slide17.xml><?xml version="1.0" encoding="utf-8"?>
 <p:sld xmlns:a="http://schemas.openxmlformats.org/drawingml/2006/main" xmlns:r="http://schemas.openxmlformats.org/officeDocument/2006/relationships" xmlns:p="http://schemas.openxmlformats.org/presentationml/2006/main">
   <p:cSld>
     <p:spTree>
@@ -9788,26 +9959,6 @@
 </file>
 
 <file path=customXml/item1.xml><?xml version="1.0" encoding="utf-8"?>
-<p:properties xmlns:p="http://schemas.microsoft.com/office/2006/metadata/properties" xmlns:xsi="http://www.w3.org/2001/XMLSchema-instance" xmlns:pc="http://schemas.microsoft.com/office/infopath/2007/PartnerControls">
-  <documentManagement>
-    <VSO_x0020_item_x0020_id xmlns="40262f94-9f35-4ac3-9a90-690165a166b7" xsi:nil="true"/>
-    <Assetid_x0020_ xmlns="40262f94-9f35-4ac3-9a90-690165a166b7" xsi:nil="true"/>
-    <Item_x0020_Details xmlns="40262f94-9f35-4ac3-9a90-690165a166b7" xsi:nil="true"/>
-    <Template_x0020_details xmlns="40262f94-9f35-4ac3-9a90-690165a166b7" xsi:nil="true"/>
-  </documentManagement>
-</p:properties>
-</file>
-
-<file path=customXml/item2.xml><?xml version="1.0" encoding="utf-8"?>
-<?mso-contentType ?>
-<FormTemplates xmlns="http://schemas.microsoft.com/sharepoint/v3/contenttype/forms">
-  <Display>DocumentLibraryForm</Display>
-  <Edit>DocumentLibraryForm</Edit>
-  <New>DocumentLibraryForm</New>
-</FormTemplates>
-</file>
-
-<file path=customXml/item3.xml><?xml version="1.0" encoding="utf-8"?>
 <ct:contentTypeSchema xmlns:ct="http://schemas.microsoft.com/office/2006/metadata/contentType" xmlns:ma="http://schemas.microsoft.com/office/2006/metadata/properties/metaAttributes" ct:_="" ma:_="" ma:contentTypeName="Document" ma:contentTypeID="0x010100AA3F7D94069FF64A86F7DFF56D60E3BE" ma:contentTypeVersion="6" ma:contentTypeDescription="Create a new document." ma:contentTypeScope="" ma:versionID="c32302c77d4085ecf495bdddb7f5e889">
   <xsd:schema xmlns:xsd="http://www.w3.org/2001/XMLSchema" xmlns:xs="http://www.w3.org/2001/XMLSchema" xmlns:p="http://schemas.microsoft.com/office/2006/metadata/properties" xmlns:ns2="a4f35948-e619-41b3-aa29-22878b09cfd2" xmlns:ns3="40262f94-9f35-4ac3-9a90-690165a166b7" targetNamespace="http://schemas.microsoft.com/office/2006/metadata/properties" ma:root="true" ma:fieldsID="4ab5ae46be95f9d0be6107e8200be7a2" ns2:_="" ns3:_="">
     <xsd:import namespace="a4f35948-e619-41b3-aa29-22878b09cfd2"/>
@@ -9988,32 +10139,27 @@
 </ct:contentTypeSchema>
 </file>
 
-<file path=customXml/itemProps1.xml><?xml version="1.0" encoding="utf-8"?>
-<ds:datastoreItem xmlns:ds="http://schemas.openxmlformats.org/officeDocument/2006/customXml" ds:itemID="{045C5BB1-9D2C-412A-AE6C-0FC75190A4CE}">
-  <ds:schemaRefs>
-    <ds:schemaRef ds:uri="http://schemas.microsoft.com/office/2006/documentManagement/types"/>
-    <ds:schemaRef ds:uri="http://schemas.microsoft.com/office/infopath/2007/PartnerControls"/>
-    <ds:schemaRef ds:uri="http://purl.org/dc/elements/1.1/"/>
-    <ds:schemaRef ds:uri="http://schemas.microsoft.com/office/2006/metadata/properties"/>
-    <ds:schemaRef ds:uri="http://purl.org/dc/terms/"/>
-    <ds:schemaRef ds:uri="http://schemas.openxmlformats.org/package/2006/metadata/core-properties"/>
-    <ds:schemaRef ds:uri="40262f94-9f35-4ac3-9a90-690165a166b7"/>
-    <ds:schemaRef ds:uri="a4f35948-e619-41b3-aa29-22878b09cfd2"/>
-    <ds:schemaRef ds:uri="http://www.w3.org/XML/1998/namespace"/>
-    <ds:schemaRef ds:uri="http://purl.org/dc/dcmitype/"/>
-  </ds:schemaRefs>
-</ds:datastoreItem>
+<file path=customXml/item2.xml><?xml version="1.0" encoding="utf-8"?>
+<?mso-contentType ?>
+<FormTemplates xmlns="http://schemas.microsoft.com/sharepoint/v3/contenttype/forms">
+  <Display>DocumentLibraryForm</Display>
+  <Edit>DocumentLibraryForm</Edit>
+  <New>DocumentLibraryForm</New>
+</FormTemplates>
 </file>
 
-<file path=customXml/itemProps2.xml><?xml version="1.0" encoding="utf-8"?>
-<ds:datastoreItem xmlns:ds="http://schemas.openxmlformats.org/officeDocument/2006/customXml" ds:itemID="{2B6DE00F-F2BC-4082-AB87-D0D78777DE1E}">
-  <ds:schemaRefs>
-    <ds:schemaRef ds:uri="http://schemas.microsoft.com/sharepoint/v3/contenttype/forms"/>
-  </ds:schemaRefs>
-</ds:datastoreItem>
+<file path=customXml/item3.xml><?xml version="1.0" encoding="utf-8"?>
+<p:properties xmlns:p="http://schemas.microsoft.com/office/2006/metadata/properties" xmlns:xsi="http://www.w3.org/2001/XMLSchema-instance" xmlns:pc="http://schemas.microsoft.com/office/infopath/2007/PartnerControls">
+  <documentManagement>
+    <VSO_x0020_item_x0020_id xmlns="40262f94-9f35-4ac3-9a90-690165a166b7" xsi:nil="true"/>
+    <Assetid_x0020_ xmlns="40262f94-9f35-4ac3-9a90-690165a166b7" xsi:nil="true"/>
+    <Item_x0020_Details xmlns="40262f94-9f35-4ac3-9a90-690165a166b7" xsi:nil="true"/>
+    <Template_x0020_details xmlns="40262f94-9f35-4ac3-9a90-690165a166b7" xsi:nil="true"/>
+  </documentManagement>
+</p:properties>
 </file>
 
-<file path=customXml/itemProps3.xml><?xml version="1.0" encoding="utf-8"?>
+<file path=customXml/itemProps1.xml><?xml version="1.0" encoding="utf-8"?>
 <ds:datastoreItem xmlns:ds="http://schemas.openxmlformats.org/officeDocument/2006/customXml" ds:itemID="{E6A2223A-9182-462D-922F-5606A5A90760}">
   <ds:schemaRefs>
     <ds:schemaRef ds:uri="http://schemas.microsoft.com/office/2006/metadata/contentType"/>
@@ -10030,4 +10176,29 @@
     <ds:schemaRef ds:uri="http://schemas.microsoft.com/internal/obd"/>
   </ds:schemaRefs>
 </ds:datastoreItem>
+</file>
+
+<file path=customXml/itemProps2.xml><?xml version="1.0" encoding="utf-8"?>
+<ds:datastoreItem xmlns:ds="http://schemas.openxmlformats.org/officeDocument/2006/customXml" ds:itemID="{2B6DE00F-F2BC-4082-AB87-D0D78777DE1E}">
+  <ds:schemaRefs>
+    <ds:schemaRef ds:uri="http://schemas.microsoft.com/sharepoint/v3/contenttype/forms"/>
+  </ds:schemaRefs>
+</ds:datastoreItem>
+</file>
+
+<file path=customXml/itemProps3.xml><?xml version="1.0" encoding="utf-8"?>
+<ds:datastoreItem xmlns:ds="http://schemas.openxmlformats.org/officeDocument/2006/customXml" ds:itemID="{045C5BB1-9D2C-412A-AE6C-0FC75190A4CE}">
+  <ds:schemaRefs>
+    <ds:schemaRef ds:uri="http://schemas.microsoft.com/office/2006/documentManagement/types"/>
+    <ds:schemaRef ds:uri="http://schemas.microsoft.com/office/infopath/2007/PartnerControls"/>
+    <ds:schemaRef ds:uri="http://purl.org/dc/elements/1.1/"/>
+    <ds:schemaRef ds:uri="http://schemas.microsoft.com/office/2006/metadata/properties"/>
+    <ds:schemaRef ds:uri="http://purl.org/dc/terms/"/>
+    <ds:schemaRef ds:uri="http://schemas.openxmlformats.org/package/2006/metadata/core-properties"/>
+    <ds:schemaRef ds:uri="40262f94-9f35-4ac3-9a90-690165a166b7"/>
+    <ds:schemaRef ds:uri="a4f35948-e619-41b3-aa29-22878b09cfd2"/>
+    <ds:schemaRef ds:uri="http://www.w3.org/XML/1998/namespace"/>
+    <ds:schemaRef ds:uri="http://purl.org/dc/dcmitype/"/>
+  </ds:schemaRefs>
+</ds:datastoreItem>
 </file>
</xml_diff>